<commit_message>
Literaturverzeichnis worked + Planning Poker
</commit_message>
<xml_diff>
--- a/a1008 (1).pptx
+++ b/a1008 (1).pptx
@@ -5,7 +5,7 @@
     <p:sldMasterId id="2147483648" r:id="rId1"/>
   </p:sldMasterIdLst>
   <p:notesMasterIdLst>
-    <p:notesMasterId r:id="rId25"/>
+    <p:notesMasterId r:id="rId26"/>
   </p:notesMasterIdLst>
   <p:sldIdLst>
     <p:sldId id="256" r:id="rId2"/>
@@ -13,24 +13,25 @@
     <p:sldId id="258" r:id="rId4"/>
     <p:sldId id="284" r:id="rId5"/>
     <p:sldId id="259" r:id="rId6"/>
-    <p:sldId id="283" r:id="rId7"/>
-    <p:sldId id="260" r:id="rId8"/>
-    <p:sldId id="261" r:id="rId9"/>
-    <p:sldId id="272" r:id="rId10"/>
-    <p:sldId id="275" r:id="rId11"/>
-    <p:sldId id="273" r:id="rId12"/>
-    <p:sldId id="274" r:id="rId13"/>
-    <p:sldId id="262" r:id="rId14"/>
-    <p:sldId id="276" r:id="rId15"/>
-    <p:sldId id="277" r:id="rId16"/>
-    <p:sldId id="278" r:id="rId17"/>
-    <p:sldId id="279" r:id="rId18"/>
-    <p:sldId id="280" r:id="rId19"/>
-    <p:sldId id="265" r:id="rId20"/>
-    <p:sldId id="268" r:id="rId21"/>
-    <p:sldId id="266" r:id="rId22"/>
-    <p:sldId id="267" r:id="rId23"/>
-    <p:sldId id="271" r:id="rId24"/>
+    <p:sldId id="285" r:id="rId7"/>
+    <p:sldId id="283" r:id="rId8"/>
+    <p:sldId id="260" r:id="rId9"/>
+    <p:sldId id="261" r:id="rId10"/>
+    <p:sldId id="272" r:id="rId11"/>
+    <p:sldId id="275" r:id="rId12"/>
+    <p:sldId id="273" r:id="rId13"/>
+    <p:sldId id="274" r:id="rId14"/>
+    <p:sldId id="262" r:id="rId15"/>
+    <p:sldId id="276" r:id="rId16"/>
+    <p:sldId id="277" r:id="rId17"/>
+    <p:sldId id="278" r:id="rId18"/>
+    <p:sldId id="279" r:id="rId19"/>
+    <p:sldId id="280" r:id="rId20"/>
+    <p:sldId id="265" r:id="rId21"/>
+    <p:sldId id="268" r:id="rId22"/>
+    <p:sldId id="266" r:id="rId23"/>
+    <p:sldId id="267" r:id="rId24"/>
+    <p:sldId id="271" r:id="rId25"/>
   </p:sldIdLst>
   <p:sldSz cx="12192000" cy="6858000"/>
   <p:notesSz cx="6858000" cy="9144000"/>
@@ -4340,7 +4341,7 @@
       <dgm:spPr/>
     </dgm:pt>
     <dgm:pt modelId="{C30D65B2-6C94-41D4-8867-97647E6F8348}" type="pres">
-      <dgm:prSet presAssocID="{D7B4B0E6-03B0-4AD9-97ED-55BAC6973041}" presName="Background" presStyleLbl="bgImgPlace1" presStyleIdx="0" presStyleCnt="1" custScaleX="133157" custScaleY="110507" custLinFactNeighborX="23" custLinFactNeighborY="-2913"/>
+      <dgm:prSet presAssocID="{D7B4B0E6-03B0-4AD9-97ED-55BAC6973041}" presName="Background" presStyleLbl="bgImgPlace1" presStyleIdx="0" presStyleCnt="1" custScaleX="133157" custScaleY="110507" custLinFactNeighborX="23" custLinFactNeighborY="-2547"/>
       <dgm:spPr>
         <a:solidFill>
           <a:schemeClr val="bg1">
@@ -4379,7 +4380,7 @@
       </dgm:spPr>
     </dgm:pt>
     <dgm:pt modelId="{49CA7C3C-33E5-4071-85A0-32DE82F5C16D}" type="pres">
-      <dgm:prSet presAssocID="{D7B4B0E6-03B0-4AD9-97ED-55BAC6973041}" presName="Minus" presStyleLbl="alignNode1" presStyleIdx="1" presStyleCnt="2" custLinFactY="-18182" custLinFactNeighborX="92173" custLinFactNeighborY="-100000"/>
+      <dgm:prSet presAssocID="{D7B4B0E6-03B0-4AD9-97ED-55BAC6973041}" presName="Minus" presStyleLbl="alignNode1" presStyleIdx="1" presStyleCnt="2" custLinFactY="-11363" custLinFactNeighborX="92173" custLinFactNeighborY="-100000"/>
       <dgm:spPr>
         <a:solidFill>
           <a:srgbClr val="C00000"/>
@@ -5711,7 +5712,7 @@
       </dsp:nvSpPr>
       <dsp:spPr>
         <a:xfrm>
-          <a:off x="431375" y="357714"/>
+          <a:off x="431375" y="370564"/>
           <a:ext cx="9046374" cy="3879875"/>
         </a:xfrm>
         <a:prstGeom prst="rect">
@@ -12024,7 +12025,7 @@
           <a:p>
             <a:fld id="{C9071F95-0312-4097-A033-B27785ED25A1}" type="slidenum">
               <a:rPr lang="de-DE" smtClean="0"/>
-              <a:t>8</a:t>
+              <a:t>9</a:t>
             </a:fld>
             <a:endParaRPr lang="de-DE"/>
           </a:p>
@@ -12108,7 +12109,7 @@
           <a:p>
             <a:fld id="{C9071F95-0312-4097-A033-B27785ED25A1}" type="slidenum">
               <a:rPr lang="de-DE" smtClean="0"/>
-              <a:t>10</a:t>
+              <a:t>11</a:t>
             </a:fld>
             <a:endParaRPr lang="de-DE"/>
           </a:p>
@@ -12192,7 +12193,7 @@
           <a:p>
             <a:fld id="{C9071F95-0312-4097-A033-B27785ED25A1}" type="slidenum">
               <a:rPr lang="de-DE" smtClean="0"/>
-              <a:t>11</a:t>
+              <a:t>12</a:t>
             </a:fld>
             <a:endParaRPr lang="de-DE"/>
           </a:p>
@@ -17896,6 +17897,405 @@
       </p:sp>
       <p:graphicFrame>
         <p:nvGraphicFramePr>
+          <p:cNvPr id="17" name="Tabelle 17">
+            <a:extLst>
+              <a:ext uri="{FF2B5EF4-FFF2-40B4-BE49-F238E27FC236}">
+                <a16:creationId xmlns:a16="http://schemas.microsoft.com/office/drawing/2014/main" id="{55D4826C-00D6-4701-8073-53FDF10BBBEC}"/>
+              </a:ext>
+            </a:extLst>
+          </p:cNvPr>
+          <p:cNvGraphicFramePr>
+            <a:graphicFrameLocks noGrp="1"/>
+          </p:cNvGraphicFramePr>
+          <p:nvPr>
+            <p:ph idx="1"/>
+            <p:extLst>
+              <p:ext uri="{D42A27DB-BD31-4B8C-83A1-F6EECF244321}">
+                <p14:modId xmlns:p14="http://schemas.microsoft.com/office/powerpoint/2010/main" val="149457715"/>
+              </p:ext>
+            </p:extLst>
+          </p:nvPr>
+        </p:nvGraphicFramePr>
+        <p:xfrm>
+          <a:off x="1141413" y="2667000"/>
+          <a:ext cx="9906000" cy="1651000"/>
+        </p:xfrm>
+        <a:graphic>
+          <a:graphicData uri="http://schemas.openxmlformats.org/drawingml/2006/table">
+            <a:tbl>
+              <a:tblPr firstRow="1" bandRow="1">
+                <a:tableStyleId>{5C22544A-7EE6-4342-B048-85BDC9FD1C3A}</a:tableStyleId>
+              </a:tblPr>
+              <a:tblGrid>
+                <a:gridCol w="4953000">
+                  <a:extLst>
+                    <a:ext uri="{9D8B030D-6E8A-4147-A177-3AD203B41FA5}">
+                      <a16:colId xmlns:a16="http://schemas.microsoft.com/office/drawing/2014/main" val="1761273252"/>
+                    </a:ext>
+                  </a:extLst>
+                </a:gridCol>
+                <a:gridCol w="4953000">
+                  <a:extLst>
+                    <a:ext uri="{9D8B030D-6E8A-4147-A177-3AD203B41FA5}">
+                      <a16:colId xmlns:a16="http://schemas.microsoft.com/office/drawing/2014/main" val="2172551086"/>
+                    </a:ext>
+                  </a:extLst>
+                </a:gridCol>
+              </a:tblGrid>
+              <a:tr h="370840">
+                <a:tc gridSpan="2">
+                  <a:txBody>
+                    <a:bodyPr/>
+                    <a:lstStyle/>
+                    <a:p>
+                      <a:pPr algn="ctr"/>
+                      <a:r>
+                        <a:rPr lang="de-DE" dirty="0">
+                          <a:effectLst>
+                            <a:outerShdw blurRad="38100" dist="38100" dir="2700000" algn="tl">
+                              <a:srgbClr val="000000">
+                                <a:alpha val="43137"/>
+                              </a:srgbClr>
+                            </a:outerShdw>
+                          </a:effectLst>
+                        </a:rPr>
+                        <a:t>Ansätze der empirischen Sozialforschung</a:t>
+                      </a:r>
+                    </a:p>
+                  </a:txBody>
+                  <a:tcPr/>
+                </a:tc>
+                <a:tc hMerge="1">
+                  <a:txBody>
+                    <a:bodyPr/>
+                    <a:lstStyle/>
+                    <a:p>
+                      <a:endParaRPr lang="de-DE"/>
+                    </a:p>
+                  </a:txBody>
+                  <a:tcPr/>
+                </a:tc>
+                <a:extLst>
+                  <a:ext uri="{0D108BD9-81ED-4DB2-BD59-A6C34878D82A}">
+                    <a16:rowId xmlns:a16="http://schemas.microsoft.com/office/drawing/2014/main" val="1597324515"/>
+                  </a:ext>
+                </a:extLst>
+              </a:tr>
+              <a:tr h="370840">
+                <a:tc>
+                  <a:txBody>
+                    <a:bodyPr/>
+                    <a:lstStyle/>
+                    <a:p>
+                      <a:pPr marL="0" marR="0" lvl="0" indent="0" algn="ctr" defTabSz="457200" rtl="0" eaLnBrk="1" fontAlgn="auto" latinLnBrk="0" hangingPunct="1">
+                        <a:lnSpc>
+                          <a:spcPct val="100000"/>
+                        </a:lnSpc>
+                        <a:spcBef>
+                          <a:spcPts val="0"/>
+                        </a:spcBef>
+                        <a:spcAft>
+                          <a:spcPts val="0"/>
+                        </a:spcAft>
+                        <a:buClrTx/>
+                        <a:buSzTx/>
+                        <a:buFontTx/>
+                        <a:buNone/>
+                        <a:tabLst/>
+                        <a:defRPr/>
+                      </a:pPr>
+                      <a:r>
+                        <a:rPr lang="de-DE" dirty="0">
+                          <a:effectLst>
+                            <a:outerShdw blurRad="38100" dist="38100" dir="2700000" algn="tl">
+                              <a:srgbClr val="000000">
+                                <a:alpha val="43137"/>
+                              </a:srgbClr>
+                            </a:outerShdw>
+                          </a:effectLst>
+                        </a:rPr>
+                        <a:t>Quantitativ:</a:t>
+                      </a:r>
+                    </a:p>
+                    <a:p>
+                      <a:pPr algn="ctr"/>
+                      <a:endParaRPr lang="de-DE" dirty="0">
+                        <a:effectLst>
+                          <a:outerShdw blurRad="38100" dist="38100" dir="2700000" algn="tl">
+                            <a:srgbClr val="000000">
+                              <a:alpha val="43137"/>
+                            </a:srgbClr>
+                          </a:outerShdw>
+                        </a:effectLst>
+                      </a:endParaRPr>
+                    </a:p>
+                  </a:txBody>
+                  <a:tcPr/>
+                </a:tc>
+                <a:tc>
+                  <a:txBody>
+                    <a:bodyPr/>
+                    <a:lstStyle/>
+                    <a:p>
+                      <a:pPr marL="0" marR="0" lvl="0" indent="0" algn="ctr" defTabSz="457200" rtl="0" eaLnBrk="1" fontAlgn="auto" latinLnBrk="0" hangingPunct="1">
+                        <a:lnSpc>
+                          <a:spcPct val="100000"/>
+                        </a:lnSpc>
+                        <a:spcBef>
+                          <a:spcPts val="0"/>
+                        </a:spcBef>
+                        <a:spcAft>
+                          <a:spcPts val="0"/>
+                        </a:spcAft>
+                        <a:buClrTx/>
+                        <a:buSzTx/>
+                        <a:buFontTx/>
+                        <a:buNone/>
+                        <a:tabLst/>
+                        <a:defRPr/>
+                      </a:pPr>
+                      <a:r>
+                        <a:rPr lang="de-DE" dirty="0">
+                          <a:effectLst>
+                            <a:outerShdw blurRad="38100" dist="38100" dir="2700000" algn="tl">
+                              <a:srgbClr val="000000">
+                                <a:alpha val="43137"/>
+                              </a:srgbClr>
+                            </a:outerShdw>
+                          </a:effectLst>
+                        </a:rPr>
+                        <a:t>Qualitativ:</a:t>
+                      </a:r>
+                    </a:p>
+                  </a:txBody>
+                  <a:tcPr/>
+                </a:tc>
+                <a:extLst>
+                  <a:ext uri="{0D108BD9-81ED-4DB2-BD59-A6C34878D82A}">
+                    <a16:rowId xmlns:a16="http://schemas.microsoft.com/office/drawing/2014/main" val="3090413412"/>
+                  </a:ext>
+                </a:extLst>
+              </a:tr>
+              <a:tr h="370840">
+                <a:tc>
+                  <a:txBody>
+                    <a:bodyPr/>
+                    <a:lstStyle/>
+                    <a:p>
+                      <a:pPr marL="0" marR="0" lvl="0" indent="0" algn="l" defTabSz="457200" rtl="0" eaLnBrk="1" fontAlgn="auto" latinLnBrk="0" hangingPunct="1">
+                        <a:lnSpc>
+                          <a:spcPct val="100000"/>
+                        </a:lnSpc>
+                        <a:spcBef>
+                          <a:spcPts val="0"/>
+                        </a:spcBef>
+                        <a:spcAft>
+                          <a:spcPts val="0"/>
+                        </a:spcAft>
+                        <a:buClrTx/>
+                        <a:buSzTx/>
+                        <a:buFontTx/>
+                        <a:buNone/>
+                        <a:tabLst/>
+                        <a:defRPr/>
+                      </a:pPr>
+                      <a:r>
+                        <a:rPr lang="de-DE" b="1" dirty="0"/>
+                        <a:t>Überprüfung</a:t>
+                      </a:r>
+                      <a:r>
+                        <a:rPr lang="de-DE" dirty="0"/>
+                        <a:t> vorhandener Theorien und Hypothesen</a:t>
+                      </a:r>
+                    </a:p>
+                  </a:txBody>
+                  <a:tcPr/>
+                </a:tc>
+                <a:tc>
+                  <a:txBody>
+                    <a:bodyPr/>
+                    <a:lstStyle/>
+                    <a:p>
+                      <a:pPr marL="0" marR="0" lvl="0" indent="0" algn="l" defTabSz="457200" rtl="0" eaLnBrk="1" fontAlgn="auto" latinLnBrk="0" hangingPunct="1">
+                        <a:lnSpc>
+                          <a:spcPct val="100000"/>
+                        </a:lnSpc>
+                        <a:spcBef>
+                          <a:spcPts val="0"/>
+                        </a:spcBef>
+                        <a:spcAft>
+                          <a:spcPts val="0"/>
+                        </a:spcAft>
+                        <a:buClrTx/>
+                        <a:buSzTx/>
+                        <a:buFontTx/>
+                        <a:buNone/>
+                        <a:tabLst/>
+                        <a:defRPr/>
+                      </a:pPr>
+                      <a:r>
+                        <a:rPr lang="de-DE" b="1" dirty="0"/>
+                        <a:t>Entwicklung</a:t>
+                      </a:r>
+                      <a:r>
+                        <a:rPr lang="de-DE" dirty="0"/>
+                        <a:t> neuer Theorien und Hypothesen</a:t>
+                      </a:r>
+                    </a:p>
+                  </a:txBody>
+                  <a:tcPr/>
+                </a:tc>
+                <a:extLst>
+                  <a:ext uri="{0D108BD9-81ED-4DB2-BD59-A6C34878D82A}">
+                    <a16:rowId xmlns:a16="http://schemas.microsoft.com/office/drawing/2014/main" val="4026824468"/>
+                  </a:ext>
+                </a:extLst>
+              </a:tr>
+            </a:tbl>
+          </a:graphicData>
+        </a:graphic>
+      </p:graphicFrame>
+      <p:sp>
+        <p:nvSpPr>
+          <p:cNvPr id="3" name="Textfeld 2">
+            <a:extLst>
+              <a:ext uri="{FF2B5EF4-FFF2-40B4-BE49-F238E27FC236}">
+                <a16:creationId xmlns:a16="http://schemas.microsoft.com/office/drawing/2014/main" id="{933E464A-C32E-4AC9-82D6-D9BC65167FA7}"/>
+              </a:ext>
+            </a:extLst>
+          </p:cNvPr>
+          <p:cNvSpPr txBox="1"/>
+          <p:nvPr/>
+        </p:nvSpPr>
+        <p:spPr>
+          <a:xfrm>
+            <a:off x="6826931" y="5728062"/>
+            <a:ext cx="5365069" cy="830997"/>
+          </a:xfrm>
+          <a:prstGeom prst="rect">
+            <a:avLst/>
+          </a:prstGeom>
+          <a:noFill/>
+        </p:spPr>
+        <p:txBody>
+          <a:bodyPr wrap="square" rtlCol="0">
+            <a:spAutoFit/>
+          </a:bodyPr>
+          <a:lstStyle/>
+          <a:p>
+            <a:r>
+              <a:rPr lang="de-DE" sz="1200" dirty="0">
+                <a:solidFill>
+                  <a:schemeClr val="accent4"/>
+                </a:solidFill>
+              </a:rPr>
+              <a:t>Quellen: </a:t>
+            </a:r>
+          </a:p>
+          <a:p>
+            <a:r>
+              <a:rPr lang="de-DE" sz="1200" dirty="0">
+                <a:solidFill>
+                  <a:schemeClr val="accent4"/>
+                </a:solidFill>
+              </a:rPr>
+              <a:t>Eigene Darstellung</a:t>
+            </a:r>
+          </a:p>
+          <a:p>
+            <a:r>
+              <a:rPr lang="de-DE" sz="1200" dirty="0">
+                <a:solidFill>
+                  <a:schemeClr val="accent4"/>
+                </a:solidFill>
+              </a:rPr>
+              <a:t>vgl</a:t>
+            </a:r>
+            <a:r>
+              <a:rPr lang="de-DE" sz="1200" dirty="0"/>
+              <a:t>. </a:t>
+            </a:r>
+            <a:r>
+              <a:rPr lang="de-DE" sz="1200" dirty="0">
+                <a:hlinkClick r:id="rId2"/>
+              </a:rPr>
+              <a:t>https://www.scribbr.de/methodik/empirische-sozialforschung/</a:t>
+            </a:r>
+            <a:endParaRPr lang="de-DE" sz="1200" dirty="0"/>
+          </a:p>
+          <a:p>
+            <a:r>
+              <a:rPr lang="de-DE" sz="1200" dirty="0">
+                <a:solidFill>
+                  <a:schemeClr val="accent3"/>
+                </a:solidFill>
+              </a:rPr>
+              <a:t>vgl. Moon, 2021, S. 138, 152, 169</a:t>
+            </a:r>
+          </a:p>
+        </p:txBody>
+      </p:sp>
+    </p:spTree>
+    <p:extLst>
+      <p:ext uri="{BB962C8B-B14F-4D97-AF65-F5344CB8AC3E}">
+        <p14:creationId xmlns:p14="http://schemas.microsoft.com/office/powerpoint/2010/main" val="1457865203"/>
+      </p:ext>
+    </p:extLst>
+  </p:cSld>
+  <p:clrMapOvr>
+    <a:masterClrMapping/>
+  </p:clrMapOvr>
+</p:sld>
+</file>
+
+<file path=ppt/slides/slide11.xml><?xml version="1.0" encoding="utf-8"?>
+<p:sld xmlns:a="http://schemas.openxmlformats.org/drawingml/2006/main" xmlns:r="http://schemas.openxmlformats.org/officeDocument/2006/relationships" xmlns:p="http://schemas.openxmlformats.org/presentationml/2006/main">
+  <p:cSld>
+    <p:spTree>
+      <p:nvGrpSpPr>
+        <p:cNvPr id="1" name=""/>
+        <p:cNvGrpSpPr/>
+        <p:nvPr/>
+      </p:nvGrpSpPr>
+      <p:grpSpPr>
+        <a:xfrm>
+          <a:off x="0" y="0"/>
+          <a:ext cx="0" cy="0"/>
+          <a:chOff x="0" y="0"/>
+          <a:chExt cx="0" cy="0"/>
+        </a:xfrm>
+      </p:grpSpPr>
+      <p:sp>
+        <p:nvSpPr>
+          <p:cNvPr id="2" name="Titel 1">
+            <a:extLst>
+              <a:ext uri="{FF2B5EF4-FFF2-40B4-BE49-F238E27FC236}">
+                <a16:creationId xmlns:a16="http://schemas.microsoft.com/office/drawing/2014/main" id="{C69C870D-64F4-42DA-A8E5-366FD6E597F8}"/>
+              </a:ext>
+            </a:extLst>
+          </p:cNvPr>
+          <p:cNvSpPr>
+            <a:spLocks noGrp="1"/>
+          </p:cNvSpPr>
+          <p:nvPr>
+            <p:ph type="title"/>
+          </p:nvPr>
+        </p:nvSpPr>
+        <p:spPr/>
+        <p:txBody>
+          <a:bodyPr/>
+          <a:lstStyle/>
+          <a:p>
+            <a:pPr algn="ctr"/>
+            <a:r>
+              <a:rPr lang="de-DE" dirty="0"/>
+              <a:t>Delphi - Methode</a:t>
+            </a:r>
+          </a:p>
+        </p:txBody>
+      </p:sp>
+      <p:graphicFrame>
+        <p:nvGraphicFramePr>
           <p:cNvPr id="5" name="Inhaltsplatzhalter 4">
             <a:extLst>
               <a:ext uri="{FF2B5EF4-FFF2-40B4-BE49-F238E27FC236}">
@@ -18073,7 +18473,7 @@
 </p:sld>
 </file>
 
-<file path=ppt/slides/slide11.xml><?xml version="1.0" encoding="utf-8"?>
+<file path=ppt/slides/slide12.xml><?xml version="1.0" encoding="utf-8"?>
 <p:sld xmlns:a="http://schemas.openxmlformats.org/drawingml/2006/main" xmlns:r="http://schemas.openxmlformats.org/officeDocument/2006/relationships" xmlns:p="http://schemas.openxmlformats.org/presentationml/2006/main">
   <p:cSld>
     <p:spTree>
@@ -18212,7 +18612,7 @@
 </p:sld>
 </file>
 
-<file path=ppt/slides/slide12.xml><?xml version="1.0" encoding="utf-8"?>
+<file path=ppt/slides/slide13.xml><?xml version="1.0" encoding="utf-8"?>
 <p:sld xmlns:a="http://schemas.openxmlformats.org/drawingml/2006/main" xmlns:r="http://schemas.openxmlformats.org/officeDocument/2006/relationships" xmlns:p="http://schemas.openxmlformats.org/presentationml/2006/main">
   <p:cSld>
     <p:spTree>
@@ -18274,7 +18674,7 @@
             <p:ph idx="1"/>
             <p:extLst>
               <p:ext uri="{D42A27DB-BD31-4B8C-83A1-F6EECF244321}">
-                <p14:modId xmlns:p14="http://schemas.microsoft.com/office/powerpoint/2010/main" val="3701133134"/>
+                <p14:modId xmlns:p14="http://schemas.microsoft.com/office/powerpoint/2010/main" val="2340066188"/>
               </p:ext>
             </p:extLst>
           </p:nvPr>
@@ -18416,7 +18816,7 @@
 </p:sld>
 </file>
 
-<file path=ppt/slides/slide13.xml><?xml version="1.0" encoding="utf-8"?>
+<file path=ppt/slides/slide14.xml><?xml version="1.0" encoding="utf-8"?>
 <p:sld xmlns:a="http://schemas.openxmlformats.org/drawingml/2006/main" xmlns:r="http://schemas.openxmlformats.org/officeDocument/2006/relationships" xmlns:p="http://schemas.openxmlformats.org/presentationml/2006/main">
   <p:cSld>
     <p:spTree>
@@ -18613,7 +19013,7 @@
 </p:sld>
 </file>
 
-<file path=ppt/slides/slide14.xml><?xml version="1.0" encoding="utf-8"?>
+<file path=ppt/slides/slide15.xml><?xml version="1.0" encoding="utf-8"?>
 <p:sld xmlns:a="http://schemas.openxmlformats.org/drawingml/2006/main" xmlns:r="http://schemas.openxmlformats.org/officeDocument/2006/relationships" xmlns:p="http://schemas.openxmlformats.org/presentationml/2006/main">
   <p:cSld>
     <p:spTree>
@@ -18730,7 +19130,7 @@
 </p:sld>
 </file>
 
-<file path=ppt/slides/slide15.xml><?xml version="1.0" encoding="utf-8"?>
+<file path=ppt/slides/slide16.xml><?xml version="1.0" encoding="utf-8"?>
 <p:sld xmlns:a="http://schemas.openxmlformats.org/drawingml/2006/main" xmlns:r="http://schemas.openxmlformats.org/officeDocument/2006/relationships" xmlns:p="http://schemas.openxmlformats.org/presentationml/2006/main">
   <p:cSld>
     <p:spTree>
@@ -19204,7 +19604,7 @@
 </p:sld>
 </file>
 
-<file path=ppt/slides/slide16.xml><?xml version="1.0" encoding="utf-8"?>
+<file path=ppt/slides/slide17.xml><?xml version="1.0" encoding="utf-8"?>
 <p:sld xmlns:a="http://schemas.openxmlformats.org/drawingml/2006/main" xmlns:r="http://schemas.openxmlformats.org/officeDocument/2006/relationships" xmlns:p="http://schemas.openxmlformats.org/presentationml/2006/main">
   <p:cSld>
     <p:spTree>
@@ -22271,7 +22671,7 @@
 </p:sld>
 </file>
 
-<file path=ppt/slides/slide17.xml><?xml version="1.0" encoding="utf-8"?>
+<file path=ppt/slides/slide18.xml><?xml version="1.0" encoding="utf-8"?>
 <p:sld xmlns:a="http://schemas.openxmlformats.org/drawingml/2006/main" xmlns:r="http://schemas.openxmlformats.org/officeDocument/2006/relationships" xmlns:p="http://schemas.openxmlformats.org/presentationml/2006/main">
   <p:cSld>
     <p:spTree>
@@ -22370,7 +22770,7 @@
 </p:sld>
 </file>
 
-<file path=ppt/slides/slide18.xml><?xml version="1.0" encoding="utf-8"?>
+<file path=ppt/slides/slide19.xml><?xml version="1.0" encoding="utf-8"?>
 <p:sld xmlns:a="http://schemas.openxmlformats.org/drawingml/2006/main" xmlns:r="http://schemas.openxmlformats.org/officeDocument/2006/relationships" xmlns:p="http://schemas.openxmlformats.org/presentationml/2006/main">
   <p:cSld>
     <p:spTree>
@@ -22764,90 +23164,6 @@
 </p:sld>
 </file>
 
-<file path=ppt/slides/slide19.xml><?xml version="1.0" encoding="utf-8"?>
-<p:sld xmlns:a="http://schemas.openxmlformats.org/drawingml/2006/main" xmlns:r="http://schemas.openxmlformats.org/officeDocument/2006/relationships" xmlns:p="http://schemas.openxmlformats.org/presentationml/2006/main">
-  <p:cSld>
-    <p:spTree>
-      <p:nvGrpSpPr>
-        <p:cNvPr id="1" name=""/>
-        <p:cNvGrpSpPr/>
-        <p:nvPr/>
-      </p:nvGrpSpPr>
-      <p:grpSpPr>
-        <a:xfrm>
-          <a:off x="0" y="0"/>
-          <a:ext cx="0" cy="0"/>
-          <a:chOff x="0" y="0"/>
-          <a:chExt cx="0" cy="0"/>
-        </a:xfrm>
-      </p:grpSpPr>
-      <p:sp>
-        <p:nvSpPr>
-          <p:cNvPr id="2" name="Titel 1">
-            <a:extLst>
-              <a:ext uri="{FF2B5EF4-FFF2-40B4-BE49-F238E27FC236}">
-                <a16:creationId xmlns:a16="http://schemas.microsoft.com/office/drawing/2014/main" id="{ECBAF7B1-E23F-48B9-BA51-9A02452902DD}"/>
-              </a:ext>
-            </a:extLst>
-          </p:cNvPr>
-          <p:cNvSpPr>
-            <a:spLocks noGrp="1"/>
-          </p:cNvSpPr>
-          <p:nvPr>
-            <p:ph type="title"/>
-          </p:nvPr>
-        </p:nvSpPr>
-        <p:spPr/>
-        <p:txBody>
-          <a:bodyPr/>
-          <a:lstStyle/>
-          <a:p>
-            <a:pPr algn="ctr"/>
-            <a:r>
-              <a:rPr lang="de-DE" dirty="0"/>
-              <a:t>Fazit &amp; Wahl der Schätzmethode</a:t>
-            </a:r>
-          </a:p>
-        </p:txBody>
-      </p:sp>
-      <p:sp>
-        <p:nvSpPr>
-          <p:cNvPr id="3" name="Inhaltsplatzhalter 2">
-            <a:extLst>
-              <a:ext uri="{FF2B5EF4-FFF2-40B4-BE49-F238E27FC236}">
-                <a16:creationId xmlns:a16="http://schemas.microsoft.com/office/drawing/2014/main" id="{93567E31-E6DA-41BF-98A3-F6DF118F7F86}"/>
-              </a:ext>
-            </a:extLst>
-          </p:cNvPr>
-          <p:cNvSpPr>
-            <a:spLocks noGrp="1"/>
-          </p:cNvSpPr>
-          <p:nvPr>
-            <p:ph idx="1"/>
-          </p:nvPr>
-        </p:nvSpPr>
-        <p:spPr/>
-        <p:txBody>
-          <a:bodyPr/>
-          <a:lstStyle/>
-          <a:p>
-            <a:endParaRPr lang="de-DE"/>
-          </a:p>
-        </p:txBody>
-      </p:sp>
-    </p:spTree>
-    <p:extLst>
-      <p:ext uri="{BB962C8B-B14F-4D97-AF65-F5344CB8AC3E}">
-        <p14:creationId xmlns:p14="http://schemas.microsoft.com/office/powerpoint/2010/main" val="975627160"/>
-      </p:ext>
-    </p:extLst>
-  </p:cSld>
-  <p:clrMapOvr>
-    <a:masterClrMapping/>
-  </p:clrMapOvr>
-</p:sld>
-</file>
-
 <file path=ppt/slides/slide2.xml><?xml version="1.0" encoding="utf-8"?>
 <p:sld xmlns:a="http://schemas.openxmlformats.org/drawingml/2006/main" xmlns:r="http://schemas.openxmlformats.org/officeDocument/2006/relationships" xmlns:p="http://schemas.openxmlformats.org/presentationml/2006/main">
   <p:cSld>
@@ -22973,6 +23289,90 @@
 </file>
 
 <file path=ppt/slides/slide20.xml><?xml version="1.0" encoding="utf-8"?>
+<p:sld xmlns:a="http://schemas.openxmlformats.org/drawingml/2006/main" xmlns:r="http://schemas.openxmlformats.org/officeDocument/2006/relationships" xmlns:p="http://schemas.openxmlformats.org/presentationml/2006/main">
+  <p:cSld>
+    <p:spTree>
+      <p:nvGrpSpPr>
+        <p:cNvPr id="1" name=""/>
+        <p:cNvGrpSpPr/>
+        <p:nvPr/>
+      </p:nvGrpSpPr>
+      <p:grpSpPr>
+        <a:xfrm>
+          <a:off x="0" y="0"/>
+          <a:ext cx="0" cy="0"/>
+          <a:chOff x="0" y="0"/>
+          <a:chExt cx="0" cy="0"/>
+        </a:xfrm>
+      </p:grpSpPr>
+      <p:sp>
+        <p:nvSpPr>
+          <p:cNvPr id="2" name="Titel 1">
+            <a:extLst>
+              <a:ext uri="{FF2B5EF4-FFF2-40B4-BE49-F238E27FC236}">
+                <a16:creationId xmlns:a16="http://schemas.microsoft.com/office/drawing/2014/main" id="{ECBAF7B1-E23F-48B9-BA51-9A02452902DD}"/>
+              </a:ext>
+            </a:extLst>
+          </p:cNvPr>
+          <p:cNvSpPr>
+            <a:spLocks noGrp="1"/>
+          </p:cNvSpPr>
+          <p:nvPr>
+            <p:ph type="title"/>
+          </p:nvPr>
+        </p:nvSpPr>
+        <p:spPr/>
+        <p:txBody>
+          <a:bodyPr/>
+          <a:lstStyle/>
+          <a:p>
+            <a:pPr algn="ctr"/>
+            <a:r>
+              <a:rPr lang="de-DE" dirty="0"/>
+              <a:t>Fazit &amp; Wahl der Schätzmethode</a:t>
+            </a:r>
+          </a:p>
+        </p:txBody>
+      </p:sp>
+      <p:sp>
+        <p:nvSpPr>
+          <p:cNvPr id="3" name="Inhaltsplatzhalter 2">
+            <a:extLst>
+              <a:ext uri="{FF2B5EF4-FFF2-40B4-BE49-F238E27FC236}">
+                <a16:creationId xmlns:a16="http://schemas.microsoft.com/office/drawing/2014/main" id="{93567E31-E6DA-41BF-98A3-F6DF118F7F86}"/>
+              </a:ext>
+            </a:extLst>
+          </p:cNvPr>
+          <p:cNvSpPr>
+            <a:spLocks noGrp="1"/>
+          </p:cNvSpPr>
+          <p:nvPr>
+            <p:ph idx="1"/>
+          </p:nvPr>
+        </p:nvSpPr>
+        <p:spPr/>
+        <p:txBody>
+          <a:bodyPr/>
+          <a:lstStyle/>
+          <a:p>
+            <a:endParaRPr lang="de-DE"/>
+          </a:p>
+        </p:txBody>
+      </p:sp>
+    </p:spTree>
+    <p:extLst>
+      <p:ext uri="{BB962C8B-B14F-4D97-AF65-F5344CB8AC3E}">
+        <p14:creationId xmlns:p14="http://schemas.microsoft.com/office/powerpoint/2010/main" val="975627160"/>
+      </p:ext>
+    </p:extLst>
+  </p:cSld>
+  <p:clrMapOvr>
+    <a:masterClrMapping/>
+  </p:clrMapOvr>
+</p:sld>
+</file>
+
+<file path=ppt/slides/slide21.xml><?xml version="1.0" encoding="utf-8"?>
 <p:sld xmlns:a="http://schemas.openxmlformats.org/drawingml/2006/main" xmlns:r="http://schemas.openxmlformats.org/officeDocument/2006/relationships" xmlns:p="http://schemas.openxmlformats.org/presentationml/2006/main">
   <p:cSld>
     <p:spTree>
@@ -23048,7 +23448,7 @@
 </p:sld>
 </file>
 
-<file path=ppt/slides/slide21.xml><?xml version="1.0" encoding="utf-8"?>
+<file path=ppt/slides/slide22.xml><?xml version="1.0" encoding="utf-8"?>
 <p:sld xmlns:a="http://schemas.openxmlformats.org/drawingml/2006/main" xmlns:r="http://schemas.openxmlformats.org/officeDocument/2006/relationships" xmlns:p="http://schemas.openxmlformats.org/presentationml/2006/main">
   <p:cSld>
     <p:spTree>
@@ -23113,7 +23513,7 @@
         <p:spPr>
           <a:xfrm>
             <a:off x="1141412" y="2666999"/>
-            <a:ext cx="10021887" cy="3124201"/>
+            <a:ext cx="10805423" cy="4022036"/>
           </a:xfrm>
         </p:spPr>
         <p:txBody>
@@ -23158,7 +23558,7 @@
                   </a:outerShdw>
                 </a:effectLst>
               </a:rPr>
-              <a:t>, 2009	</a:t>
+              <a:t>, 2009.	 Project Management - </a:t>
             </a:r>
             <a:r>
               <a:rPr lang="en-US" sz="1600" dirty="0">
@@ -23177,7 +23577,7 @@
                   </a:outerShdw>
                 </a:effectLst>
               </a:rPr>
-              <a:t>A Systems Approach to Planning, Scheduling, and 											Controlling; Wiley Verlag; </a:t>
+              <a:t>A Systems Approach to Planning, Scheduling, and 											Controlling; Wiley Verlag, </a:t>
             </a:r>
             <a:r>
               <a:rPr lang="de-DE" sz="1600" dirty="0">
@@ -23196,13 +23596,10 @@
                   </a:outerShdw>
                 </a:effectLst>
               </a:rPr>
-              <a:t>ISBN-10: 0-470-50383-1; </a:t>
+              <a:t>Seite 494f</a:t>
             </a:r>
           </a:p>
           <a:p>
-            <a:pPr marL="0" indent="0">
-              <a:buNone/>
-            </a:pPr>
             <a:r>
               <a:rPr lang="de-DE" sz="1600" dirty="0">
                 <a:effectLst>
@@ -23220,7 +23617,7 @@
                   </a:outerShdw>
                 </a:effectLst>
               </a:rPr>
-              <a:t>						ISBN-13: 978-0-470-50383-6; Seite 494f</a:t>
+              <a:t>Romeike &amp; Hager, 2020.	Erfolgsfaktor Risiko-Management 4.0, 4. Auflage, Springer Gabler</a:t>
             </a:r>
           </a:p>
           <a:p>
@@ -23241,7 +23638,7 @@
                   </a:outerShdw>
                 </a:effectLst>
               </a:rPr>
-              <a:t>Romeike &amp; Hager, 2020	Erfolgsfaktor Risiko-Management 4.0, 4. Auflage, Springer Gabler</a:t>
+              <a:t>Moon, 2021.			Qualität im interkulturellen Trainingsbereich, Springer Gabler</a:t>
             </a:r>
           </a:p>
           <a:p>
@@ -23262,7 +23659,7 @@
                   </a:outerShdw>
                 </a:effectLst>
               </a:rPr>
-              <a:t>Moon, 2021			Qualität im interkulturellen Trainingsbereich, Springer Gabler</a:t>
+              <a:t>Schmieder, 2019.			Künstliche Intelligenz als Substitut menschlicher Arbeit, Springer Gabler</a:t>
             </a:r>
           </a:p>
           <a:p>
@@ -23283,7 +23680,7 @@
                   </a:outerShdw>
                 </a:effectLst>
               </a:rPr>
-              <a:t>Schmieder, 2019			Künstliche Intelligenz als Substitut menschlicher Arbeit, Springer Gabler</a:t>
+              <a:t>Mühlbacher, 2014.		Die IT und die Wirtschaftskrise, Diplomica Verlag GmbH</a:t>
             </a:r>
           </a:p>
           <a:p>
@@ -23304,7 +23701,7 @@
                   </a:outerShdw>
                 </a:effectLst>
               </a:rPr>
-              <a:t>Mühlbacher, 2014		Die IT und die Wirtschaftskrise, Diplomica Verlag GmbH</a:t>
+              <a:t>Bühring, 2021.			Private Banking and Wealth Management Futures 2030, 1. Auflage, Springer</a:t>
             </a:r>
           </a:p>
           <a:p>
@@ -23325,8 +23722,216 @@
                   </a:outerShdw>
                 </a:effectLst>
               </a:rPr>
-              <a:t>Bühring, 2021			Private Banking and Wealth Management Futures 2030, 1. Auflage, Springer</a:t>
+              <a:t>Pries/</a:t>
             </a:r>
+            <a:r>
+              <a:rPr lang="de-DE" sz="1600" dirty="0" err="1">
+                <a:effectLst>
+                  <a:glow rad="38100">
+                    <a:schemeClr val="bg1">
+                      <a:lumMod val="50000"/>
+                      <a:lumOff val="50000"/>
+                      <a:alpha val="20000"/>
+                    </a:schemeClr>
+                  </a:glow>
+                  <a:outerShdw blurRad="38100" dist="38100" dir="2700000" algn="tl">
+                    <a:srgbClr val="000000">
+                      <a:alpha val="43137"/>
+                    </a:srgbClr>
+                  </a:outerShdw>
+                </a:effectLst>
+              </a:rPr>
+              <a:t>Quigley</a:t>
+            </a:r>
+            <a:r>
+              <a:rPr lang="de-DE" sz="1600" dirty="0">
+                <a:effectLst>
+                  <a:glow rad="38100">
+                    <a:schemeClr val="bg1">
+                      <a:lumMod val="50000"/>
+                      <a:lumOff val="50000"/>
+                      <a:alpha val="20000"/>
+                    </a:schemeClr>
+                  </a:glow>
+                  <a:outerShdw blurRad="38100" dist="38100" dir="2700000" algn="tl">
+                    <a:srgbClr val="000000">
+                      <a:alpha val="43137"/>
+                    </a:srgbClr>
+                  </a:outerShdw>
+                </a:effectLst>
+              </a:rPr>
+              <a:t>, 2010.				</a:t>
+            </a:r>
+            <a:r>
+              <a:rPr lang="de-DE" sz="1600" dirty="0" err="1">
+                <a:effectLst>
+                  <a:glow rad="38100">
+                    <a:schemeClr val="bg1">
+                      <a:lumMod val="50000"/>
+                      <a:lumOff val="50000"/>
+                      <a:alpha val="20000"/>
+                    </a:schemeClr>
+                  </a:glow>
+                  <a:outerShdw blurRad="38100" dist="38100" dir="2700000" algn="tl">
+                    <a:srgbClr val="000000">
+                      <a:alpha val="43137"/>
+                    </a:srgbClr>
+                  </a:outerShdw>
+                </a:effectLst>
+              </a:rPr>
+              <a:t>Scrum</a:t>
+            </a:r>
+            <a:r>
+              <a:rPr lang="de-DE" sz="1600" dirty="0">
+                <a:effectLst>
+                  <a:glow rad="38100">
+                    <a:schemeClr val="bg1">
+                      <a:lumMod val="50000"/>
+                      <a:lumOff val="50000"/>
+                      <a:alpha val="20000"/>
+                    </a:schemeClr>
+                  </a:glow>
+                  <a:outerShdw blurRad="38100" dist="38100" dir="2700000" algn="tl">
+                    <a:srgbClr val="000000">
+                      <a:alpha val="43137"/>
+                    </a:srgbClr>
+                  </a:outerShdw>
+                </a:effectLst>
+              </a:rPr>
+              <a:t> Project Management, CRC Press 	</a:t>
+            </a:r>
+          </a:p>
+          <a:p>
+            <a:r>
+              <a:rPr lang="de-DE" sz="1600" dirty="0" err="1">
+                <a:effectLst>
+                  <a:glow rad="38100">
+                    <a:schemeClr val="bg1">
+                      <a:lumMod val="50000"/>
+                      <a:lumOff val="50000"/>
+                      <a:alpha val="20000"/>
+                    </a:schemeClr>
+                  </a:glow>
+                  <a:outerShdw blurRad="38100" dist="38100" dir="2700000" algn="tl">
+                    <a:srgbClr val="000000">
+                      <a:alpha val="43137"/>
+                    </a:srgbClr>
+                  </a:outerShdw>
+                </a:effectLst>
+              </a:rPr>
+              <a:t>Trendowicz</a:t>
+            </a:r>
+            <a:r>
+              <a:rPr lang="de-DE" sz="1600" dirty="0">
+                <a:effectLst>
+                  <a:glow rad="38100">
+                    <a:schemeClr val="bg1">
+                      <a:lumMod val="50000"/>
+                      <a:lumOff val="50000"/>
+                      <a:alpha val="20000"/>
+                    </a:schemeClr>
+                  </a:glow>
+                  <a:outerShdw blurRad="38100" dist="38100" dir="2700000" algn="tl">
+                    <a:srgbClr val="000000">
+                      <a:alpha val="43137"/>
+                    </a:srgbClr>
+                  </a:outerShdw>
+                </a:effectLst>
+              </a:rPr>
+              <a:t>/Jeffery, 2014. Software Project </a:t>
+            </a:r>
+            <a:r>
+              <a:rPr lang="de-DE" sz="1600" dirty="0" err="1">
+                <a:effectLst>
+                  <a:glow rad="38100">
+                    <a:schemeClr val="bg1">
+                      <a:lumMod val="50000"/>
+                      <a:lumOff val="50000"/>
+                      <a:alpha val="20000"/>
+                    </a:schemeClr>
+                  </a:glow>
+                  <a:outerShdw blurRad="38100" dist="38100" dir="2700000" algn="tl">
+                    <a:srgbClr val="000000">
+                      <a:alpha val="43137"/>
+                    </a:srgbClr>
+                  </a:outerShdw>
+                </a:effectLst>
+              </a:rPr>
+              <a:t>Effort</a:t>
+            </a:r>
+            <a:r>
+              <a:rPr lang="de-DE" sz="1600" dirty="0">
+                <a:effectLst>
+                  <a:glow rad="38100">
+                    <a:schemeClr val="bg1">
+                      <a:lumMod val="50000"/>
+                      <a:lumOff val="50000"/>
+                      <a:alpha val="20000"/>
+                    </a:schemeClr>
+                  </a:glow>
+                  <a:outerShdw blurRad="38100" dist="38100" dir="2700000" algn="tl">
+                    <a:srgbClr val="000000">
+                      <a:alpha val="43137"/>
+                    </a:srgbClr>
+                  </a:outerShdw>
+                </a:effectLst>
+              </a:rPr>
+              <a:t> </a:t>
+            </a:r>
+            <a:r>
+              <a:rPr lang="de-DE" sz="1600" dirty="0" err="1">
+                <a:effectLst>
+                  <a:glow rad="38100">
+                    <a:schemeClr val="bg1">
+                      <a:lumMod val="50000"/>
+                      <a:lumOff val="50000"/>
+                      <a:alpha val="20000"/>
+                    </a:schemeClr>
+                  </a:glow>
+                  <a:outerShdw blurRad="38100" dist="38100" dir="2700000" algn="tl">
+                    <a:srgbClr val="000000">
+                      <a:alpha val="43137"/>
+                    </a:srgbClr>
+                  </a:outerShdw>
+                </a:effectLst>
+              </a:rPr>
+              <a:t>Estimation</a:t>
+            </a:r>
+            <a:r>
+              <a:rPr lang="de-DE" sz="1600" dirty="0">
+                <a:effectLst>
+                  <a:glow rad="38100">
+                    <a:schemeClr val="bg1">
+                      <a:lumMod val="50000"/>
+                      <a:lumOff val="50000"/>
+                      <a:alpha val="20000"/>
+                    </a:schemeClr>
+                  </a:glow>
+                  <a:outerShdw blurRad="38100" dist="38100" dir="2700000" algn="tl">
+                    <a:srgbClr val="000000">
+                      <a:alpha val="43137"/>
+                    </a:srgbClr>
+                  </a:outerShdw>
+                </a:effectLst>
+              </a:rPr>
+              <a:t>, Springer International Publishing9		</a:t>
+            </a:r>
+            <a:endParaRPr lang="de-DE" sz="800" dirty="0">
+              <a:effectLst>
+                <a:glow rad="38100">
+                  <a:schemeClr val="bg1">
+                    <a:lumMod val="50000"/>
+                    <a:lumOff val="50000"/>
+                    <a:alpha val="20000"/>
+                  </a:schemeClr>
+                </a:glow>
+                <a:outerShdw blurRad="38100" dist="38100" dir="2700000" algn="tl">
+                  <a:srgbClr val="000000">
+                    <a:alpha val="43137"/>
+                  </a:srgbClr>
+                </a:outerShdw>
+              </a:effectLst>
+            </a:endParaRPr>
           </a:p>
         </p:txBody>
       </p:sp>
@@ -23343,7 +23948,7 @@
 </p:sld>
 </file>
 
-<file path=ppt/slides/slide22.xml><?xml version="1.0" encoding="utf-8"?>
+<file path=ppt/slides/slide23.xml><?xml version="1.0" encoding="utf-8"?>
 <p:sld xmlns:a="http://schemas.openxmlformats.org/drawingml/2006/main" xmlns:r="http://schemas.openxmlformats.org/officeDocument/2006/relationships" xmlns:p="http://schemas.openxmlformats.org/presentationml/2006/main">
   <p:cSld>
     <p:spTree>
@@ -23376,7 +23981,12 @@
             <p:ph type="title"/>
           </p:nvPr>
         </p:nvSpPr>
-        <p:spPr/>
+        <p:spPr>
+          <a:xfrm>
+            <a:off x="1143001" y="609600"/>
+            <a:ext cx="9905998" cy="1905000"/>
+          </a:xfrm>
+        </p:spPr>
         <p:txBody>
           <a:bodyPr/>
           <a:lstStyle/>
@@ -23407,12 +24017,14 @@
         </p:nvSpPr>
         <p:spPr>
           <a:xfrm>
-            <a:off x="984659" y="1761308"/>
+            <a:off x="1014476" y="2781300"/>
             <a:ext cx="9905998" cy="3124201"/>
           </a:xfrm>
         </p:spPr>
         <p:txBody>
-          <a:bodyPr/>
+          <a:bodyPr>
+            <a:normAutofit/>
+          </a:bodyPr>
           <a:lstStyle/>
           <a:p>
             <a:r>
@@ -23509,6 +24121,14 @@
             <a:pPr marL="0" indent="0">
               <a:buNone/>
             </a:pPr>
+            <a:endParaRPr lang="de-DE" dirty="0">
+              <a:effectLst/>
+            </a:endParaRPr>
+          </a:p>
+          <a:p>
+            <a:pPr marL="0" indent="0">
+              <a:buNone/>
+            </a:pPr>
             <a:endParaRPr lang="de-DE" dirty="0"/>
           </a:p>
         </p:txBody>
@@ -23526,7 +24146,7 @@
 </p:sld>
 </file>
 
-<file path=ppt/slides/slide23.xml><?xml version="1.0" encoding="utf-8"?>
+<file path=ppt/slides/slide24.xml><?xml version="1.0" encoding="utf-8"?>
 <p:sld xmlns:a="http://schemas.openxmlformats.org/drawingml/2006/main" xmlns:r="http://schemas.openxmlformats.org/officeDocument/2006/relationships" xmlns:p="http://schemas.openxmlformats.org/presentationml/2006/main">
   <p:cSld>
     <p:spTree>
@@ -23848,14 +24468,21 @@
               <a:rPr lang="de-DE" dirty="0"/>
             </a:br>
             <a:r>
+              <a:rPr lang="de-DE" dirty="0" err="1"/>
+              <a:t>Planning</a:t>
+            </a:r>
+            <a:r>
               <a:rPr lang="de-DE" dirty="0"/>
-              <a:t>Poker </a:t>
+              <a:t> Poker/</a:t>
             </a:r>
             <a:r>
               <a:rPr lang="de-DE" dirty="0" err="1"/>
-              <a:t>PlanninG</a:t>
+              <a:t>Scrum</a:t>
             </a:r>
-            <a:endParaRPr lang="de-DE" dirty="0"/>
+            <a:r>
+              <a:rPr lang="de-DE" dirty="0"/>
+              <a:t> Poker</a:t>
+            </a:r>
           </a:p>
         </p:txBody>
       </p:sp>
@@ -23875,12 +24502,167 @@
             <p:ph idx="1"/>
           </p:nvPr>
         </p:nvSpPr>
-        <p:spPr/>
+        <p:spPr>
+          <a:xfrm>
+            <a:off x="649494" y="2991679"/>
+            <a:ext cx="10397917" cy="3187148"/>
+          </a:xfrm>
+        </p:spPr>
         <p:txBody>
-          <a:bodyPr/>
+          <a:bodyPr>
+            <a:normAutofit/>
+          </a:bodyPr>
           <a:lstStyle/>
           <a:p>
+            <a:pPr lvl="1"/>
+            <a:r>
+              <a:rPr lang="de-DE" dirty="0"/>
+              <a:t>Was?:	Agile Aufwandschätzung (Zeit)</a:t>
+            </a:r>
+          </a:p>
+          <a:p>
+            <a:pPr lvl="1"/>
+            <a:r>
+              <a:rPr lang="de-DE" dirty="0"/>
+              <a:t>Mittel: 	13 Karten (0-100, ? , Kaffeetasse)</a:t>
+            </a:r>
+          </a:p>
+          <a:p>
+            <a:pPr lvl="1"/>
+            <a:r>
+              <a:rPr lang="de-DE" dirty="0"/>
+              <a:t>Idee:		Jede Karte schätzt den Aufwand einer Teilaufgabe</a:t>
+            </a:r>
+          </a:p>
+          <a:p>
+            <a:pPr lvl="1"/>
+            <a:r>
+              <a:rPr lang="de-DE" dirty="0"/>
+              <a:t>Mitspieler:	Moderator (</a:t>
+            </a:r>
+            <a:r>
+              <a:rPr lang="de-DE" dirty="0" err="1"/>
+              <a:t>Scrum</a:t>
+            </a:r>
+            <a:r>
+              <a:rPr lang="de-DE" dirty="0"/>
+              <a:t> Master) , Mitglieder des Entwicklungsteams/Auftraggebers</a:t>
+            </a:r>
+          </a:p>
+          <a:p>
+            <a:pPr marL="457200" lvl="1" indent="0">
+              <a:buNone/>
+            </a:pPr>
             <a:endParaRPr lang="de-DE" dirty="0"/>
+          </a:p>
+          <a:p>
+            <a:pPr lvl="1"/>
+            <a:endParaRPr lang="de-DE" dirty="0"/>
+          </a:p>
+          <a:p>
+            <a:pPr lvl="1"/>
+            <a:endParaRPr lang="de-DE" dirty="0"/>
+          </a:p>
+          <a:p>
+            <a:pPr lvl="1"/>
+            <a:endParaRPr lang="de-DE" dirty="0"/>
+          </a:p>
+        </p:txBody>
+      </p:sp>
+      <p:sp>
+        <p:nvSpPr>
+          <p:cNvPr id="7" name="Textfeld 6">
+            <a:extLst>
+              <a:ext uri="{FF2B5EF4-FFF2-40B4-BE49-F238E27FC236}">
+                <a16:creationId xmlns:a16="http://schemas.microsoft.com/office/drawing/2014/main" id="{73369F67-C297-4A39-880C-6B4F1711E880}"/>
+              </a:ext>
+            </a:extLst>
+          </p:cNvPr>
+          <p:cNvSpPr txBox="1"/>
+          <p:nvPr/>
+        </p:nvSpPr>
+        <p:spPr>
+          <a:xfrm>
+            <a:off x="8760414" y="5680051"/>
+            <a:ext cx="3165231" cy="461665"/>
+          </a:xfrm>
+          <a:prstGeom prst="rect">
+            <a:avLst/>
+          </a:prstGeom>
+          <a:noFill/>
+        </p:spPr>
+        <p:txBody>
+          <a:bodyPr wrap="square" rtlCol="0">
+            <a:spAutoFit/>
+          </a:bodyPr>
+          <a:lstStyle/>
+          <a:p>
+            <a:r>
+              <a:rPr lang="de-DE" sz="1200" dirty="0">
+                <a:solidFill>
+                  <a:schemeClr val="accent4"/>
+                </a:solidFill>
+              </a:rPr>
+              <a:t>Quellen:</a:t>
+            </a:r>
+          </a:p>
+          <a:p>
+            <a:r>
+              <a:rPr lang="de-DE" sz="1200" dirty="0">
+                <a:solidFill>
+                  <a:schemeClr val="accent4"/>
+                </a:solidFill>
+                <a:effectLst/>
+                <a:latin typeface="Calibri" panose="020F0502020204030204" pitchFamily="34" charset="0"/>
+                <a:ea typeface="Calibri" panose="020F0502020204030204" pitchFamily="34" charset="0"/>
+                <a:cs typeface="Times New Roman" panose="02020603050405020304" pitchFamily="18" charset="0"/>
+              </a:rPr>
+              <a:t>vgl. Pries/</a:t>
+            </a:r>
+            <a:r>
+              <a:rPr lang="de-DE" sz="1200" dirty="0" err="1">
+                <a:solidFill>
+                  <a:schemeClr val="accent4"/>
+                </a:solidFill>
+                <a:effectLst/>
+                <a:latin typeface="Calibri" panose="020F0502020204030204" pitchFamily="34" charset="0"/>
+                <a:ea typeface="Calibri" panose="020F0502020204030204" pitchFamily="34" charset="0"/>
+                <a:cs typeface="Times New Roman" panose="02020603050405020304" pitchFamily="18" charset="0"/>
+              </a:rPr>
+              <a:t>Quigley</a:t>
+            </a:r>
+            <a:r>
+              <a:rPr lang="de-DE" sz="1200" dirty="0">
+                <a:solidFill>
+                  <a:schemeClr val="accent4"/>
+                </a:solidFill>
+                <a:effectLst/>
+                <a:latin typeface="Calibri" panose="020F0502020204030204" pitchFamily="34" charset="0"/>
+                <a:ea typeface="Calibri" panose="020F0502020204030204" pitchFamily="34" charset="0"/>
+                <a:cs typeface="Times New Roman" panose="02020603050405020304" pitchFamily="18" charset="0"/>
+              </a:rPr>
+              <a:t>, 2010, S. </a:t>
+            </a:r>
+            <a:r>
+              <a:rPr lang="de-DE" sz="1200" dirty="0">
+                <a:solidFill>
+                  <a:schemeClr val="accent4"/>
+                </a:solidFill>
+                <a:latin typeface="Calibri" panose="020F0502020204030204" pitchFamily="34" charset="0"/>
+                <a:ea typeface="Calibri" panose="020F0502020204030204" pitchFamily="34" charset="0"/>
+                <a:cs typeface="Times New Roman" panose="02020603050405020304" pitchFamily="18" charset="0"/>
+              </a:rPr>
+              <a:t>29 ff. </a:t>
+            </a:r>
+            <a:endParaRPr lang="de-DE" sz="1200" dirty="0">
+              <a:solidFill>
+                <a:schemeClr val="accent4"/>
+              </a:solidFill>
+              <a:effectLst/>
+              <a:latin typeface="Calibri" panose="020F0502020204030204" pitchFamily="34" charset="0"/>
+              <a:ea typeface="Calibri" panose="020F0502020204030204" pitchFamily="34" charset="0"/>
+              <a:cs typeface="Times New Roman" panose="02020603050405020304" pitchFamily="18" charset="0"/>
+            </a:endParaRPr>
           </a:p>
         </p:txBody>
       </p:sp>
@@ -23919,6 +24701,326 @@
           <p:cNvPr id="2" name="Titel 1">
             <a:extLst>
               <a:ext uri="{FF2B5EF4-FFF2-40B4-BE49-F238E27FC236}">
+                <a16:creationId xmlns:a16="http://schemas.microsoft.com/office/drawing/2014/main" id="{C12DA842-434C-48EC-AA00-932485FFE94D}"/>
+              </a:ext>
+            </a:extLst>
+          </p:cNvPr>
+          <p:cNvSpPr>
+            <a:spLocks noGrp="1"/>
+          </p:cNvSpPr>
+          <p:nvPr>
+            <p:ph type="title"/>
+          </p:nvPr>
+        </p:nvSpPr>
+        <p:spPr/>
+        <p:txBody>
+          <a:bodyPr/>
+          <a:lstStyle/>
+          <a:p>
+            <a:pPr algn="ctr"/>
+            <a:r>
+              <a:rPr lang="de-DE" dirty="0"/>
+              <a:t>Funktionsweise Poker - </a:t>
+            </a:r>
+            <a:r>
+              <a:rPr lang="de-DE" dirty="0" err="1"/>
+              <a:t>Planning</a:t>
+            </a:r>
+            <a:endParaRPr lang="de-DE" dirty="0"/>
+          </a:p>
+        </p:txBody>
+      </p:sp>
+      <p:sp>
+        <p:nvSpPr>
+          <p:cNvPr id="3" name="Inhaltsplatzhalter 2">
+            <a:extLst>
+              <a:ext uri="{FF2B5EF4-FFF2-40B4-BE49-F238E27FC236}">
+                <a16:creationId xmlns:a16="http://schemas.microsoft.com/office/drawing/2014/main" id="{6F7B5D3F-AA20-43C7-8ED0-747F7C1BE41C}"/>
+              </a:ext>
+            </a:extLst>
+          </p:cNvPr>
+          <p:cNvSpPr>
+            <a:spLocks noGrp="1"/>
+          </p:cNvSpPr>
+          <p:nvPr>
+            <p:ph idx="1"/>
+          </p:nvPr>
+        </p:nvSpPr>
+        <p:spPr>
+          <a:xfrm>
+            <a:off x="1141413" y="2411897"/>
+            <a:ext cx="10576823" cy="4081669"/>
+          </a:xfrm>
+        </p:spPr>
+        <p:txBody>
+          <a:bodyPr>
+            <a:normAutofit fontScale="92500" lnSpcReduction="20000"/>
+          </a:bodyPr>
+          <a:lstStyle/>
+          <a:p>
+            <a:r>
+              <a:rPr lang="de-DE" dirty="0"/>
+              <a:t>Vorbereitung</a:t>
+            </a:r>
+          </a:p>
+          <a:p>
+            <a:pPr lvl="1">
+              <a:buFont typeface="Courier New" panose="02070309020205020404" pitchFamily="49" charset="0"/>
+              <a:buChar char="o"/>
+            </a:pPr>
+            <a:r>
+              <a:rPr lang="de-DE" dirty="0"/>
+              <a:t>Definition der zu bewertenden Aufgaben</a:t>
+            </a:r>
+          </a:p>
+          <a:p>
+            <a:r>
+              <a:rPr lang="de-DE" dirty="0"/>
+              <a:t>Durchführung</a:t>
+            </a:r>
+          </a:p>
+          <a:p>
+            <a:pPr lvl="1">
+              <a:buFont typeface="Courier New" panose="02070309020205020404" pitchFamily="49" charset="0"/>
+              <a:buChar char="o"/>
+            </a:pPr>
+            <a:r>
+              <a:rPr lang="de-DE" dirty="0"/>
+              <a:t>Diskussion in der Gruppe der Aufgaben</a:t>
+            </a:r>
+          </a:p>
+          <a:p>
+            <a:pPr lvl="1">
+              <a:buFont typeface="Courier New" panose="02070309020205020404" pitchFamily="49" charset="0"/>
+              <a:buChar char="o"/>
+            </a:pPr>
+            <a:r>
+              <a:rPr lang="de-DE" dirty="0"/>
+              <a:t>Schätzen des Aufwandes</a:t>
+            </a:r>
+          </a:p>
+          <a:p>
+            <a:r>
+              <a:rPr lang="de-DE" dirty="0"/>
+              <a:t>Ergebnisfindung</a:t>
+            </a:r>
+          </a:p>
+          <a:p>
+            <a:pPr lvl="1">
+              <a:buFont typeface="Courier New" panose="02070309020205020404" pitchFamily="49" charset="0"/>
+              <a:buChar char="o"/>
+            </a:pPr>
+            <a:r>
+              <a:rPr lang="de-DE" dirty="0"/>
+              <a:t>Konsens</a:t>
+            </a:r>
+          </a:p>
+          <a:p>
+            <a:pPr lvl="1">
+              <a:buFont typeface="Courier New" panose="02070309020205020404" pitchFamily="49" charset="0"/>
+              <a:buChar char="o"/>
+            </a:pPr>
+            <a:r>
+              <a:rPr lang="de-DE" dirty="0"/>
+              <a:t>geringe Abweichung</a:t>
+            </a:r>
+          </a:p>
+          <a:p>
+            <a:pPr lvl="1">
+              <a:buFont typeface="Courier New" panose="02070309020205020404" pitchFamily="49" charset="0"/>
+              <a:buChar char="o"/>
+            </a:pPr>
+            <a:r>
+              <a:rPr lang="de-DE" dirty="0"/>
+              <a:t>große Abweichung</a:t>
+            </a:r>
+          </a:p>
+          <a:p>
+            <a:pPr>
+              <a:buFont typeface="Arial" panose="020B0604020202020204" pitchFamily="34" charset="0"/>
+              <a:buChar char="•"/>
+            </a:pPr>
+            <a:r>
+              <a:rPr lang="de-DE" dirty="0"/>
+              <a:t>Ende</a:t>
+            </a:r>
+          </a:p>
+          <a:p>
+            <a:pPr lvl="1">
+              <a:buFont typeface="Courier New" panose="02070309020205020404" pitchFamily="49" charset="0"/>
+              <a:buChar char="o"/>
+            </a:pPr>
+            <a:r>
+              <a:rPr lang="de-DE" dirty="0"/>
+              <a:t>Summe aller Teilaufgaben werden mit Projektaufwand verglichen		evtl. Priorisierung</a:t>
+            </a:r>
+          </a:p>
+          <a:p>
+            <a:pPr lvl="1">
+              <a:buFont typeface="Arial" panose="020B0604020202020204" pitchFamily="34" charset="0"/>
+              <a:buChar char="•"/>
+            </a:pPr>
+            <a:endParaRPr lang="de-DE" dirty="0"/>
+          </a:p>
+        </p:txBody>
+      </p:sp>
+      <p:sp>
+        <p:nvSpPr>
+          <p:cNvPr id="4" name="Pfeil: nach rechts 3">
+            <a:extLst>
+              <a:ext uri="{FF2B5EF4-FFF2-40B4-BE49-F238E27FC236}">
+                <a16:creationId xmlns:a16="http://schemas.microsoft.com/office/drawing/2014/main" id="{F71924EF-FD15-451A-B030-7D1B4F9D92D0}"/>
+              </a:ext>
+            </a:extLst>
+          </p:cNvPr>
+          <p:cNvSpPr/>
+          <p:nvPr/>
+        </p:nvSpPr>
+        <p:spPr>
+          <a:xfrm>
+            <a:off x="8448261" y="5907819"/>
+            <a:ext cx="407505" cy="164989"/>
+          </a:xfrm>
+          <a:prstGeom prst="rightArrow">
+            <a:avLst/>
+          </a:prstGeom>
+          <a:solidFill>
+            <a:schemeClr val="tx1"/>
+          </a:solidFill>
+        </p:spPr>
+        <p:style>
+          <a:lnRef idx="2">
+            <a:schemeClr val="accent1">
+              <a:shade val="50000"/>
+            </a:schemeClr>
+          </a:lnRef>
+          <a:fillRef idx="1">
+            <a:schemeClr val="accent1"/>
+          </a:fillRef>
+          <a:effectRef idx="0">
+            <a:schemeClr val="accent1"/>
+          </a:effectRef>
+          <a:fontRef idx="minor">
+            <a:schemeClr val="lt1"/>
+          </a:fontRef>
+        </p:style>
+        <p:txBody>
+          <a:bodyPr rtlCol="0" anchor="ctr"/>
+          <a:lstStyle/>
+          <a:p>
+            <a:pPr algn="ctr"/>
+            <a:endParaRPr lang="de-DE"/>
+          </a:p>
+        </p:txBody>
+      </p:sp>
+      <p:sp>
+        <p:nvSpPr>
+          <p:cNvPr id="5" name="Textfeld 4">
+            <a:extLst>
+              <a:ext uri="{FF2B5EF4-FFF2-40B4-BE49-F238E27FC236}">
+                <a16:creationId xmlns:a16="http://schemas.microsoft.com/office/drawing/2014/main" id="{A968A39A-A7D6-452A-AD3D-081E1C83AA0D}"/>
+              </a:ext>
+            </a:extLst>
+          </p:cNvPr>
+          <p:cNvSpPr txBox="1"/>
+          <p:nvPr/>
+        </p:nvSpPr>
+        <p:spPr>
+          <a:xfrm>
+            <a:off x="9026769" y="6248400"/>
+            <a:ext cx="3165231" cy="461665"/>
+          </a:xfrm>
+          <a:prstGeom prst="rect">
+            <a:avLst/>
+          </a:prstGeom>
+          <a:noFill/>
+        </p:spPr>
+        <p:txBody>
+          <a:bodyPr wrap="square" rtlCol="0">
+            <a:spAutoFit/>
+          </a:bodyPr>
+          <a:lstStyle/>
+          <a:p>
+            <a:r>
+              <a:rPr lang="de-DE" sz="1200" dirty="0">
+                <a:solidFill>
+                  <a:schemeClr val="accent4"/>
+                </a:solidFill>
+              </a:rPr>
+              <a:t>Quellen:</a:t>
+            </a:r>
+          </a:p>
+          <a:p>
+            <a:r>
+              <a:rPr lang="de-DE" sz="1200" dirty="0">
+                <a:solidFill>
+                  <a:schemeClr val="accent4"/>
+                </a:solidFill>
+                <a:effectLst/>
+                <a:latin typeface="Calibri" panose="020F0502020204030204" pitchFamily="34" charset="0"/>
+                <a:ea typeface="Calibri" panose="020F0502020204030204" pitchFamily="34" charset="0"/>
+                <a:cs typeface="Times New Roman" panose="02020603050405020304" pitchFamily="18" charset="0"/>
+              </a:rPr>
+              <a:t>Anlage 1</a:t>
+            </a:r>
+            <a:r>
+              <a:rPr lang="de-DE" sz="1200" dirty="0">
+                <a:solidFill>
+                  <a:schemeClr val="accent4"/>
+                </a:solidFill>
+                <a:latin typeface="Calibri" panose="020F0502020204030204" pitchFamily="34" charset="0"/>
+                <a:ea typeface="Calibri" panose="020F0502020204030204" pitchFamily="34" charset="0"/>
+                <a:cs typeface="Times New Roman" panose="02020603050405020304" pitchFamily="18" charset="0"/>
+              </a:rPr>
+              <a:t> </a:t>
+            </a:r>
+            <a:endParaRPr lang="de-DE" sz="1200" dirty="0">
+              <a:solidFill>
+                <a:schemeClr val="accent4"/>
+              </a:solidFill>
+              <a:effectLst/>
+              <a:latin typeface="Calibri" panose="020F0502020204030204" pitchFamily="34" charset="0"/>
+              <a:ea typeface="Calibri" panose="020F0502020204030204" pitchFamily="34" charset="0"/>
+              <a:cs typeface="Times New Roman" panose="02020603050405020304" pitchFamily="18" charset="0"/>
+            </a:endParaRPr>
+          </a:p>
+        </p:txBody>
+      </p:sp>
+    </p:spTree>
+    <p:extLst>
+      <p:ext uri="{BB962C8B-B14F-4D97-AF65-F5344CB8AC3E}">
+        <p14:creationId xmlns:p14="http://schemas.microsoft.com/office/powerpoint/2010/main" val="2415990856"/>
+      </p:ext>
+    </p:extLst>
+  </p:cSld>
+  <p:clrMapOvr>
+    <a:masterClrMapping/>
+  </p:clrMapOvr>
+</p:sld>
+</file>
+
+<file path=ppt/slides/slide7.xml><?xml version="1.0" encoding="utf-8"?>
+<p:sld xmlns:a="http://schemas.openxmlformats.org/drawingml/2006/main" xmlns:r="http://schemas.openxmlformats.org/officeDocument/2006/relationships" xmlns:p="http://schemas.openxmlformats.org/presentationml/2006/main">
+  <p:cSld>
+    <p:spTree>
+      <p:nvGrpSpPr>
+        <p:cNvPr id="1" name=""/>
+        <p:cNvGrpSpPr/>
+        <p:nvPr/>
+      </p:nvGrpSpPr>
+      <p:grpSpPr>
+        <a:xfrm>
+          <a:off x="0" y="0"/>
+          <a:ext cx="0" cy="0"/>
+          <a:chOff x="0" y="0"/>
+          <a:chExt cx="0" cy="0"/>
+        </a:xfrm>
+      </p:grpSpPr>
+      <p:sp>
+        <p:nvSpPr>
+          <p:cNvPr id="2" name="Titel 1">
+            <a:extLst>
+              <a:ext uri="{FF2B5EF4-FFF2-40B4-BE49-F238E27FC236}">
                 <a16:creationId xmlns:a16="http://schemas.microsoft.com/office/drawing/2014/main" id="{F3A3E589-7665-46AC-8629-4F01B5C96BF5}"/>
               </a:ext>
             </a:extLst>
@@ -23956,28 +25058,510 @@
           </a:p>
         </p:txBody>
       </p:sp>
-      <p:sp>
-        <p:nvSpPr>
-          <p:cNvPr id="3" name="Inhaltsplatzhalter 2">
+      <p:graphicFrame>
+        <p:nvGraphicFramePr>
+          <p:cNvPr id="8" name="Tabelle 8">
             <a:extLst>
               <a:ext uri="{FF2B5EF4-FFF2-40B4-BE49-F238E27FC236}">
-                <a16:creationId xmlns:a16="http://schemas.microsoft.com/office/drawing/2014/main" id="{31A463AD-F833-487E-97E0-5D329257E033}"/>
+                <a16:creationId xmlns:a16="http://schemas.microsoft.com/office/drawing/2014/main" id="{15975E00-BB6C-4D5A-895C-5366A905B8DB}"/>
               </a:ext>
             </a:extLst>
           </p:cNvPr>
-          <p:cNvSpPr>
-            <a:spLocks noGrp="1"/>
-          </p:cNvSpPr>
+          <p:cNvGraphicFramePr>
+            <a:graphicFrameLocks noGrp="1"/>
+          </p:cNvGraphicFramePr>
           <p:nvPr>
             <p:ph idx="1"/>
+            <p:extLst>
+              <p:ext uri="{D42A27DB-BD31-4B8C-83A1-F6EECF244321}">
+                <p14:modId xmlns:p14="http://schemas.microsoft.com/office/powerpoint/2010/main" val="1650666936"/>
+              </p:ext>
+            </p:extLst>
           </p:nvPr>
+        </p:nvGraphicFramePr>
+        <p:xfrm>
+          <a:off x="1141413" y="2667000"/>
+          <a:ext cx="9906000" cy="2595880"/>
+        </p:xfrm>
+        <a:graphic>
+          <a:graphicData uri="http://schemas.openxmlformats.org/drawingml/2006/table">
+            <a:tbl>
+              <a:tblPr firstRow="1" bandRow="1">
+                <a:tableStyleId>{5C22544A-7EE6-4342-B048-85BDC9FD1C3A}</a:tableStyleId>
+              </a:tblPr>
+              <a:tblGrid>
+                <a:gridCol w="4953000">
+                  <a:extLst>
+                    <a:ext uri="{9D8B030D-6E8A-4147-A177-3AD203B41FA5}">
+                      <a16:colId xmlns:a16="http://schemas.microsoft.com/office/drawing/2014/main" val="1894090436"/>
+                    </a:ext>
+                  </a:extLst>
+                </a:gridCol>
+                <a:gridCol w="4953000">
+                  <a:extLst>
+                    <a:ext uri="{9D8B030D-6E8A-4147-A177-3AD203B41FA5}">
+                      <a16:colId xmlns:a16="http://schemas.microsoft.com/office/drawing/2014/main" val="3935749411"/>
+                    </a:ext>
+                  </a:extLst>
+                </a:gridCol>
+              </a:tblGrid>
+              <a:tr h="370840">
+                <a:tc>
+                  <a:txBody>
+                    <a:bodyPr/>
+                    <a:lstStyle/>
+                    <a:p>
+                      <a:r>
+                        <a:rPr lang="de-DE" dirty="0"/>
+                        <a:t>Vorteile </a:t>
+                      </a:r>
+                    </a:p>
+                  </a:txBody>
+                  <a:tcPr/>
+                </a:tc>
+                <a:tc>
+                  <a:txBody>
+                    <a:bodyPr/>
+                    <a:lstStyle/>
+                    <a:p>
+                      <a:r>
+                        <a:rPr lang="de-DE" dirty="0"/>
+                        <a:t>Nachteile</a:t>
+                      </a:r>
+                    </a:p>
+                  </a:txBody>
+                  <a:tcPr/>
+                </a:tc>
+                <a:extLst>
+                  <a:ext uri="{0D108BD9-81ED-4DB2-BD59-A6C34878D82A}">
+                    <a16:rowId xmlns:a16="http://schemas.microsoft.com/office/drawing/2014/main" val="622321337"/>
+                  </a:ext>
+                </a:extLst>
+              </a:tr>
+              <a:tr h="370840">
+                <a:tc>
+                  <a:txBody>
+                    <a:bodyPr/>
+                    <a:lstStyle/>
+                    <a:p>
+                      <a:r>
+                        <a:rPr lang="de-DE" dirty="0"/>
+                        <a:t>schnell &amp; einfach</a:t>
+                      </a:r>
+                    </a:p>
+                  </a:txBody>
+                  <a:tcPr/>
+                </a:tc>
+                <a:tc>
+                  <a:txBody>
+                    <a:bodyPr/>
+                    <a:lstStyle/>
+                    <a:p>
+                      <a:r>
+                        <a:rPr lang="de-DE" dirty="0"/>
+                        <a:t>teuer aufgrund von Experten</a:t>
+                      </a:r>
+                    </a:p>
+                  </a:txBody>
+                  <a:tcPr/>
+                </a:tc>
+                <a:extLst>
+                  <a:ext uri="{0D108BD9-81ED-4DB2-BD59-A6C34878D82A}">
+                    <a16:rowId xmlns:a16="http://schemas.microsoft.com/office/drawing/2014/main" val="2977608341"/>
+                  </a:ext>
+                </a:extLst>
+              </a:tr>
+              <a:tr h="370840">
+                <a:tc>
+                  <a:txBody>
+                    <a:bodyPr/>
+                    <a:lstStyle/>
+                    <a:p>
+                      <a:r>
+                        <a:rPr lang="de-DE" dirty="0"/>
+                        <a:t>Strukturiert wegen Moderator</a:t>
+                      </a:r>
+                    </a:p>
+                  </a:txBody>
+                  <a:tcPr/>
+                </a:tc>
+                <a:tc>
+                  <a:txBody>
+                    <a:bodyPr/>
+                    <a:lstStyle/>
+                    <a:p>
+                      <a:r>
+                        <a:rPr lang="de-DE" dirty="0"/>
+                        <a:t>Experten beeinflussbar</a:t>
+                      </a:r>
+                    </a:p>
+                  </a:txBody>
+                  <a:tcPr/>
+                </a:tc>
+                <a:extLst>
+                  <a:ext uri="{0D108BD9-81ED-4DB2-BD59-A6C34878D82A}">
+                    <a16:rowId xmlns:a16="http://schemas.microsoft.com/office/drawing/2014/main" val="2151068899"/>
+                  </a:ext>
+                </a:extLst>
+              </a:tr>
+              <a:tr h="370840">
+                <a:tc>
+                  <a:txBody>
+                    <a:bodyPr/>
+                    <a:lstStyle/>
+                    <a:p>
+                      <a:r>
+                        <a:rPr lang="de-DE" dirty="0"/>
+                        <a:t>Konsensorientiert und gruppendynamisch</a:t>
+                      </a:r>
+                    </a:p>
+                  </a:txBody>
+                  <a:tcPr/>
+                </a:tc>
+                <a:tc>
+                  <a:txBody>
+                    <a:bodyPr/>
+                    <a:lstStyle/>
+                    <a:p>
+                      <a:r>
+                        <a:rPr lang="de-DE" dirty="0"/>
+                        <a:t>kein Recycling möglich</a:t>
+                      </a:r>
+                    </a:p>
+                  </a:txBody>
+                  <a:tcPr/>
+                </a:tc>
+                <a:extLst>
+                  <a:ext uri="{0D108BD9-81ED-4DB2-BD59-A6C34878D82A}">
+                    <a16:rowId xmlns:a16="http://schemas.microsoft.com/office/drawing/2014/main" val="3057416602"/>
+                  </a:ext>
+                </a:extLst>
+              </a:tr>
+              <a:tr h="370840">
+                <a:tc>
+                  <a:txBody>
+                    <a:bodyPr/>
+                    <a:lstStyle/>
+                    <a:p>
+                      <a:r>
+                        <a:rPr lang="de-DE" dirty="0"/>
+                        <a:t>Höhere Qualität und Akzeptanz </a:t>
+                      </a:r>
+                    </a:p>
+                  </a:txBody>
+                  <a:tcPr/>
+                </a:tc>
+                <a:tc>
+                  <a:txBody>
+                    <a:bodyPr/>
+                    <a:lstStyle/>
+                    <a:p>
+                      <a:endParaRPr lang="de-DE" dirty="0"/>
+                    </a:p>
+                  </a:txBody>
+                  <a:tcPr/>
+                </a:tc>
+                <a:extLst>
+                  <a:ext uri="{0D108BD9-81ED-4DB2-BD59-A6C34878D82A}">
+                    <a16:rowId xmlns:a16="http://schemas.microsoft.com/office/drawing/2014/main" val="2253444025"/>
+                  </a:ext>
+                </a:extLst>
+              </a:tr>
+              <a:tr h="370840">
+                <a:tc>
+                  <a:txBody>
+                    <a:bodyPr/>
+                    <a:lstStyle/>
+                    <a:p>
+                      <a:r>
+                        <a:rPr lang="de-DE" dirty="0"/>
+                        <a:t>Teambuilding</a:t>
+                      </a:r>
+                    </a:p>
+                  </a:txBody>
+                  <a:tcPr/>
+                </a:tc>
+                <a:tc>
+                  <a:txBody>
+                    <a:bodyPr/>
+                    <a:lstStyle/>
+                    <a:p>
+                      <a:endParaRPr lang="de-DE" dirty="0"/>
+                    </a:p>
+                  </a:txBody>
+                  <a:tcPr/>
+                </a:tc>
+                <a:extLst>
+                  <a:ext uri="{0D108BD9-81ED-4DB2-BD59-A6C34878D82A}">
+                    <a16:rowId xmlns:a16="http://schemas.microsoft.com/office/drawing/2014/main" val="2128153142"/>
+                  </a:ext>
+                </a:extLst>
+              </a:tr>
+              <a:tr h="370840">
+                <a:tc>
+                  <a:txBody>
+                    <a:bodyPr/>
+                    <a:lstStyle/>
+                    <a:p>
+                      <a:r>
+                        <a:rPr lang="de-DE" dirty="0"/>
+                        <a:t>Verschiedene Sichtweisen</a:t>
+                      </a:r>
+                    </a:p>
+                  </a:txBody>
+                  <a:tcPr/>
+                </a:tc>
+                <a:tc>
+                  <a:txBody>
+                    <a:bodyPr/>
+                    <a:lstStyle/>
+                    <a:p>
+                      <a:endParaRPr lang="de-DE" dirty="0"/>
+                    </a:p>
+                  </a:txBody>
+                  <a:tcPr/>
+                </a:tc>
+                <a:extLst>
+                  <a:ext uri="{0D108BD9-81ED-4DB2-BD59-A6C34878D82A}">
+                    <a16:rowId xmlns:a16="http://schemas.microsoft.com/office/drawing/2014/main" val="214126522"/>
+                  </a:ext>
+                </a:extLst>
+              </a:tr>
+            </a:tbl>
+          </a:graphicData>
+        </a:graphic>
+      </p:graphicFrame>
+      <p:sp>
+        <p:nvSpPr>
+          <p:cNvPr id="9" name="Kreuz 8">
+            <a:extLst>
+              <a:ext uri="{FF2B5EF4-FFF2-40B4-BE49-F238E27FC236}">
+                <a16:creationId xmlns:a16="http://schemas.microsoft.com/office/drawing/2014/main" id="{E6022CC7-0767-42F1-86E0-DDBD9B1B80C7}"/>
+              </a:ext>
+            </a:extLst>
+          </p:cNvPr>
+          <p:cNvSpPr/>
+          <p:nvPr/>
         </p:nvSpPr>
-        <p:spPr/>
+        <p:spPr>
+          <a:xfrm>
+            <a:off x="3498572" y="2743198"/>
+            <a:ext cx="278297" cy="266193"/>
+          </a:xfrm>
+          <a:prstGeom prst="plus">
+            <a:avLst>
+              <a:gd name="adj" fmla="val 32810"/>
+            </a:avLst>
+          </a:prstGeom>
+          <a:solidFill>
+            <a:srgbClr val="00B050"/>
+          </a:solidFill>
+        </p:spPr>
+        <p:style>
+          <a:lnRef idx="2">
+            <a:schemeClr val="accent1">
+              <a:hueOff val="0"/>
+              <a:satOff val="0"/>
+              <a:lumOff val="0"/>
+              <a:alphaOff val="0"/>
+            </a:schemeClr>
+          </a:lnRef>
+          <a:fillRef idx="1">
+            <a:scrgbClr r="0" g="0" b="0"/>
+          </a:fillRef>
+          <a:effectRef idx="0">
+            <a:schemeClr val="accent1">
+              <a:hueOff val="0"/>
+              <a:satOff val="0"/>
+              <a:lumOff val="0"/>
+              <a:alphaOff val="0"/>
+            </a:schemeClr>
+          </a:effectRef>
+          <a:fontRef idx="minor">
+            <a:schemeClr val="lt1"/>
+          </a:fontRef>
+        </p:style>
+      </p:sp>
+      <p:sp>
+        <p:nvSpPr>
+          <p:cNvPr id="10" name="Rechteck 9">
+            <a:extLst>
+              <a:ext uri="{FF2B5EF4-FFF2-40B4-BE49-F238E27FC236}">
+                <a16:creationId xmlns:a16="http://schemas.microsoft.com/office/drawing/2014/main" id="{C62F3E7B-C443-4E3A-9435-5E6FB9EBD9B1}"/>
+              </a:ext>
+            </a:extLst>
+          </p:cNvPr>
+          <p:cNvSpPr/>
+          <p:nvPr/>
+        </p:nvSpPr>
+        <p:spPr>
+          <a:xfrm>
+            <a:off x="8415133" y="2804838"/>
+            <a:ext cx="353044" cy="142912"/>
+          </a:xfrm>
+          <a:prstGeom prst="rect">
+            <a:avLst/>
+          </a:prstGeom>
+          <a:solidFill>
+            <a:srgbClr val="C00000"/>
+          </a:solidFill>
+        </p:spPr>
+        <p:style>
+          <a:lnRef idx="2">
+            <a:schemeClr val="accent1">
+              <a:hueOff val="0"/>
+              <a:satOff val="0"/>
+              <a:lumOff val="0"/>
+              <a:alphaOff val="0"/>
+            </a:schemeClr>
+          </a:lnRef>
+          <a:fillRef idx="1">
+            <a:scrgbClr r="0" g="0" b="0"/>
+          </a:fillRef>
+          <a:effectRef idx="0">
+            <a:schemeClr val="accent1">
+              <a:hueOff val="0"/>
+              <a:satOff val="0"/>
+              <a:lumOff val="0"/>
+              <a:alphaOff val="0"/>
+            </a:schemeClr>
+          </a:effectRef>
+          <a:fontRef idx="minor">
+            <a:schemeClr val="lt1"/>
+          </a:fontRef>
+        </p:style>
+      </p:sp>
+      <p:sp>
+        <p:nvSpPr>
+          <p:cNvPr id="11" name="Textfeld 10">
+            <a:extLst>
+              <a:ext uri="{FF2B5EF4-FFF2-40B4-BE49-F238E27FC236}">
+                <a16:creationId xmlns:a16="http://schemas.microsoft.com/office/drawing/2014/main" id="{595B5DDB-4B73-4E87-915C-AC76CF1E759F}"/>
+              </a:ext>
+            </a:extLst>
+          </p:cNvPr>
+          <p:cNvSpPr txBox="1"/>
+          <p:nvPr/>
+        </p:nvSpPr>
+        <p:spPr>
+          <a:xfrm>
+            <a:off x="8768177" y="6004946"/>
+            <a:ext cx="3165231" cy="830997"/>
+          </a:xfrm>
+          <a:prstGeom prst="rect">
+            <a:avLst/>
+          </a:prstGeom>
+          <a:noFill/>
+        </p:spPr>
         <p:txBody>
-          <a:bodyPr/>
+          <a:bodyPr wrap="square" rtlCol="0">
+            <a:spAutoFit/>
+          </a:bodyPr>
           <a:lstStyle/>
           <a:p>
-            <a:endParaRPr lang="de-DE" dirty="0"/>
+            <a:r>
+              <a:rPr lang="de-DE" sz="1200" dirty="0">
+                <a:solidFill>
+                  <a:schemeClr val="accent4"/>
+                </a:solidFill>
+              </a:rPr>
+              <a:t>Quellen:</a:t>
+            </a:r>
+          </a:p>
+          <a:p>
+            <a:r>
+              <a:rPr lang="de-DE" sz="1200" dirty="0">
+                <a:solidFill>
+                  <a:schemeClr val="accent4"/>
+                </a:solidFill>
+              </a:rPr>
+              <a:t>Eigene Darstellung</a:t>
+            </a:r>
+          </a:p>
+          <a:p>
+            <a:r>
+              <a:rPr lang="de-DE" sz="1200" dirty="0">
+                <a:solidFill>
+                  <a:schemeClr val="accent4"/>
+                </a:solidFill>
+                <a:effectLst/>
+                <a:ea typeface="Calibri" panose="020F0502020204030204" pitchFamily="34" charset="0"/>
+                <a:cs typeface="Times New Roman" panose="02020603050405020304" pitchFamily="18" charset="0"/>
+              </a:rPr>
+              <a:t>vgl. Pries/</a:t>
+            </a:r>
+            <a:r>
+              <a:rPr lang="de-DE" sz="1200" dirty="0" err="1">
+                <a:solidFill>
+                  <a:schemeClr val="accent4"/>
+                </a:solidFill>
+                <a:effectLst/>
+                <a:ea typeface="Calibri" panose="020F0502020204030204" pitchFamily="34" charset="0"/>
+                <a:cs typeface="Times New Roman" panose="02020603050405020304" pitchFamily="18" charset="0"/>
+              </a:rPr>
+              <a:t>Quigley</a:t>
+            </a:r>
+            <a:r>
+              <a:rPr lang="de-DE" sz="1200" dirty="0">
+                <a:solidFill>
+                  <a:schemeClr val="accent4"/>
+                </a:solidFill>
+                <a:effectLst/>
+                <a:ea typeface="Calibri" panose="020F0502020204030204" pitchFamily="34" charset="0"/>
+                <a:cs typeface="Times New Roman" panose="02020603050405020304" pitchFamily="18" charset="0"/>
+              </a:rPr>
+              <a:t>, 2010, S. </a:t>
+            </a:r>
+            <a:r>
+              <a:rPr lang="de-DE" sz="1200" dirty="0">
+                <a:solidFill>
+                  <a:schemeClr val="accent4"/>
+                </a:solidFill>
+                <a:ea typeface="Calibri" panose="020F0502020204030204" pitchFamily="34" charset="0"/>
+                <a:cs typeface="Times New Roman" panose="02020603050405020304" pitchFamily="18" charset="0"/>
+              </a:rPr>
+              <a:t>29 ff.</a:t>
+            </a:r>
+          </a:p>
+          <a:p>
+            <a:r>
+              <a:rPr lang="de-DE" sz="1200" dirty="0">
+                <a:solidFill>
+                  <a:schemeClr val="accent4"/>
+                </a:solidFill>
+                <a:ea typeface="Calibri" panose="020F0502020204030204" pitchFamily="34" charset="0"/>
+                <a:cs typeface="Times New Roman" panose="02020603050405020304" pitchFamily="18" charset="0"/>
+              </a:rPr>
+              <a:t>vgl. </a:t>
+            </a:r>
+            <a:r>
+              <a:rPr lang="de-DE" sz="1200" dirty="0" err="1">
+                <a:solidFill>
+                  <a:schemeClr val="accent4"/>
+                </a:solidFill>
+                <a:ea typeface="Calibri" panose="020F0502020204030204" pitchFamily="34" charset="0"/>
+                <a:cs typeface="Times New Roman" panose="02020603050405020304" pitchFamily="18" charset="0"/>
+              </a:rPr>
+              <a:t>Trendowicz</a:t>
+            </a:r>
+            <a:r>
+              <a:rPr lang="de-DE" sz="1200" dirty="0">
+                <a:solidFill>
+                  <a:schemeClr val="accent4"/>
+                </a:solidFill>
+                <a:ea typeface="Calibri" panose="020F0502020204030204" pitchFamily="34" charset="0"/>
+                <a:cs typeface="Times New Roman" panose="02020603050405020304" pitchFamily="18" charset="0"/>
+              </a:rPr>
+              <a:t>/Jeffery, 2014, S. 336 f. </a:t>
+            </a:r>
+            <a:endParaRPr lang="de-DE" sz="1200" dirty="0">
+              <a:solidFill>
+                <a:schemeClr val="accent4"/>
+              </a:solidFill>
+              <a:effectLst/>
+              <a:ea typeface="Calibri" panose="020F0502020204030204" pitchFamily="34" charset="0"/>
+              <a:cs typeface="Times New Roman" panose="02020603050405020304" pitchFamily="18" charset="0"/>
+            </a:endParaRPr>
           </a:p>
         </p:txBody>
       </p:sp>
@@ -23994,7 +25578,7 @@
 </p:sld>
 </file>
 
-<file path=ppt/slides/slide7.xml><?xml version="1.0" encoding="utf-8"?>
+<file path=ppt/slides/slide8.xml><?xml version="1.0" encoding="utf-8"?>
 <p:sld xmlns:a="http://schemas.openxmlformats.org/drawingml/2006/main" xmlns:r="http://schemas.openxmlformats.org/officeDocument/2006/relationships" xmlns:p="http://schemas.openxmlformats.org/presentationml/2006/main">
   <p:cSld>
     <p:spTree>
@@ -24061,7 +25645,25 @@
           <a:bodyPr/>
           <a:lstStyle/>
           <a:p>
-            <a:endParaRPr lang="de-DE"/>
+            <a:r>
+              <a:rPr lang="de-DE" dirty="0"/>
+              <a:t>Softwareentwicklung</a:t>
+            </a:r>
+          </a:p>
+          <a:p>
+            <a:r>
+              <a:rPr lang="de-DE" dirty="0"/>
+              <a:t>Produktenwicklung</a:t>
+            </a:r>
+          </a:p>
+          <a:p>
+            <a:r>
+              <a:rPr lang="de-DE" dirty="0"/>
+              <a:t> </a:t>
+            </a:r>
+          </a:p>
+          <a:p>
+            <a:endParaRPr lang="de-DE" dirty="0"/>
           </a:p>
         </p:txBody>
       </p:sp>
@@ -24069,161 +25671,6 @@
     <p:extLst>
       <p:ext uri="{BB962C8B-B14F-4D97-AF65-F5344CB8AC3E}">
         <p14:creationId xmlns:p14="http://schemas.microsoft.com/office/powerpoint/2010/main" val="1871264163"/>
-      </p:ext>
-    </p:extLst>
-  </p:cSld>
-  <p:clrMapOvr>
-    <a:masterClrMapping/>
-  </p:clrMapOvr>
-</p:sld>
-</file>
-
-<file path=ppt/slides/slide8.xml><?xml version="1.0" encoding="utf-8"?>
-<p:sld xmlns:a="http://schemas.openxmlformats.org/drawingml/2006/main" xmlns:r="http://schemas.openxmlformats.org/officeDocument/2006/relationships" xmlns:p="http://schemas.openxmlformats.org/presentationml/2006/main">
-  <p:cSld>
-    <p:spTree>
-      <p:nvGrpSpPr>
-        <p:cNvPr id="1" name=""/>
-        <p:cNvGrpSpPr/>
-        <p:nvPr/>
-      </p:nvGrpSpPr>
-      <p:grpSpPr>
-        <a:xfrm>
-          <a:off x="0" y="0"/>
-          <a:ext cx="0" cy="0"/>
-          <a:chOff x="0" y="0"/>
-          <a:chExt cx="0" cy="0"/>
-        </a:xfrm>
-      </p:grpSpPr>
-      <p:sp>
-        <p:nvSpPr>
-          <p:cNvPr id="2" name="Titel 1">
-            <a:extLst>
-              <a:ext uri="{FF2B5EF4-FFF2-40B4-BE49-F238E27FC236}">
-                <a16:creationId xmlns:a16="http://schemas.microsoft.com/office/drawing/2014/main" id="{C69C870D-64F4-42DA-A8E5-366FD6E597F8}"/>
-              </a:ext>
-            </a:extLst>
-          </p:cNvPr>
-          <p:cNvSpPr>
-            <a:spLocks noGrp="1"/>
-          </p:cNvSpPr>
-          <p:nvPr>
-            <p:ph type="title"/>
-          </p:nvPr>
-        </p:nvSpPr>
-        <p:spPr/>
-        <p:txBody>
-          <a:bodyPr/>
-          <a:lstStyle/>
-          <a:p>
-            <a:pPr algn="ctr"/>
-            <a:r>
-              <a:rPr lang="de-DE" dirty="0"/>
-              <a:t>Delphi - Methode</a:t>
-            </a:r>
-          </a:p>
-        </p:txBody>
-      </p:sp>
-      <p:sp>
-        <p:nvSpPr>
-          <p:cNvPr id="3" name="Inhaltsplatzhalter 2">
-            <a:extLst>
-              <a:ext uri="{FF2B5EF4-FFF2-40B4-BE49-F238E27FC236}">
-                <a16:creationId xmlns:a16="http://schemas.microsoft.com/office/drawing/2014/main" id="{5E0E1D3F-8849-4EDC-9137-078B076995CC}"/>
-              </a:ext>
-            </a:extLst>
-          </p:cNvPr>
-          <p:cNvSpPr>
-            <a:spLocks noGrp="1"/>
-          </p:cNvSpPr>
-          <p:nvPr>
-            <p:ph idx="1"/>
-          </p:nvPr>
-        </p:nvSpPr>
-        <p:spPr/>
-        <p:txBody>
-          <a:bodyPr/>
-          <a:lstStyle/>
-          <a:p>
-            <a:pPr marL="0" indent="0" algn="ctr">
-              <a:buNone/>
-            </a:pPr>
-            <a:r>
-              <a:rPr lang="de-DE" dirty="0"/>
-              <a:t>Die Bezeichnung der Methode gründet der Historie wegen, in der gleichnamigen Stadt Delphi in Griechenland. Dort soll es schriftlichen Überlieferungen zufolge ein Orakel gegeben haben, an welches man sich wenden konnte um eine Vorhersage für die Zukunft zu erhalten.</a:t>
-            </a:r>
-          </a:p>
-          <a:p>
-            <a:pPr marL="0" indent="0" algn="ctr">
-              <a:buNone/>
-            </a:pPr>
-            <a:endParaRPr lang="de-DE" dirty="0"/>
-          </a:p>
-        </p:txBody>
-      </p:sp>
-      <p:sp>
-        <p:nvSpPr>
-          <p:cNvPr id="4" name="Textfeld 3">
-            <a:extLst>
-              <a:ext uri="{FF2B5EF4-FFF2-40B4-BE49-F238E27FC236}">
-                <a16:creationId xmlns:a16="http://schemas.microsoft.com/office/drawing/2014/main" id="{E4E871CA-4E43-4CA2-B078-44D1F22AF6D9}"/>
-              </a:ext>
-            </a:extLst>
-          </p:cNvPr>
-          <p:cNvSpPr txBox="1"/>
-          <p:nvPr/>
-        </p:nvSpPr>
-        <p:spPr>
-          <a:xfrm>
-            <a:off x="9224387" y="6109900"/>
-            <a:ext cx="2964209" cy="276999"/>
-          </a:xfrm>
-          <a:prstGeom prst="rect">
-            <a:avLst/>
-          </a:prstGeom>
-          <a:noFill/>
-        </p:spPr>
-        <p:txBody>
-          <a:bodyPr wrap="none" rtlCol="0">
-            <a:spAutoFit/>
-          </a:bodyPr>
-          <a:lstStyle/>
-          <a:p>
-            <a:r>
-              <a:rPr lang="de-DE" sz="1200" dirty="0">
-                <a:solidFill>
-                  <a:schemeClr val="accent4"/>
-                </a:solidFill>
-                <a:effectLst/>
-                <a:ea typeface="Calibri" panose="020F0502020204030204" pitchFamily="34" charset="0"/>
-                <a:cs typeface="Times New Roman" panose="02020603050405020304" pitchFamily="18" charset="0"/>
-              </a:rPr>
-              <a:t>Quelle</a:t>
-            </a:r>
-            <a:r>
-              <a:rPr lang="de-DE" sz="1200" dirty="0">
-                <a:solidFill>
-                  <a:schemeClr val="accent4"/>
-                </a:solidFill>
-                <a:effectLst/>
-                <a:latin typeface="Calibri" panose="020F0502020204030204" pitchFamily="34" charset="0"/>
-                <a:ea typeface="Calibri" panose="020F0502020204030204" pitchFamily="34" charset="0"/>
-                <a:cs typeface="Times New Roman" panose="02020603050405020304" pitchFamily="18" charset="0"/>
-              </a:rPr>
-              <a:t>: Vgl. Romeike &amp; Hager, 2020, S. 29ff.</a:t>
-            </a:r>
-            <a:endParaRPr lang="de-DE" sz="1200" dirty="0">
-              <a:solidFill>
-                <a:schemeClr val="accent4"/>
-              </a:solidFill>
-            </a:endParaRPr>
-          </a:p>
-        </p:txBody>
-      </p:sp>
-    </p:spTree>
-    <p:extLst>
-      <p:ext uri="{BB962C8B-B14F-4D97-AF65-F5344CB8AC3E}">
-        <p14:creationId xmlns:p14="http://schemas.microsoft.com/office/powerpoint/2010/main" val="1043685735"/>
       </p:ext>
     </p:extLst>
   </p:cSld>
@@ -24279,272 +25726,49 @@
           </a:p>
         </p:txBody>
       </p:sp>
-      <p:graphicFrame>
-        <p:nvGraphicFramePr>
-          <p:cNvPr id="17" name="Tabelle 17">
+      <p:sp>
+        <p:nvSpPr>
+          <p:cNvPr id="3" name="Inhaltsplatzhalter 2">
             <a:extLst>
               <a:ext uri="{FF2B5EF4-FFF2-40B4-BE49-F238E27FC236}">
-                <a16:creationId xmlns:a16="http://schemas.microsoft.com/office/drawing/2014/main" id="{55D4826C-00D6-4701-8073-53FDF10BBBEC}"/>
+                <a16:creationId xmlns:a16="http://schemas.microsoft.com/office/drawing/2014/main" id="{5E0E1D3F-8849-4EDC-9137-078B076995CC}"/>
               </a:ext>
             </a:extLst>
           </p:cNvPr>
-          <p:cNvGraphicFramePr>
-            <a:graphicFrameLocks noGrp="1"/>
-          </p:cNvGraphicFramePr>
+          <p:cNvSpPr>
+            <a:spLocks noGrp="1"/>
+          </p:cNvSpPr>
           <p:nvPr>
             <p:ph idx="1"/>
-            <p:extLst>
-              <p:ext uri="{D42A27DB-BD31-4B8C-83A1-F6EECF244321}">
-                <p14:modId xmlns:p14="http://schemas.microsoft.com/office/powerpoint/2010/main" val="149457715"/>
-              </p:ext>
-            </p:extLst>
           </p:nvPr>
-        </p:nvGraphicFramePr>
-        <p:xfrm>
-          <a:off x="1141413" y="2667000"/>
-          <a:ext cx="9906000" cy="1651000"/>
-        </p:xfrm>
-        <a:graphic>
-          <a:graphicData uri="http://schemas.openxmlformats.org/drawingml/2006/table">
-            <a:tbl>
-              <a:tblPr firstRow="1" bandRow="1">
-                <a:tableStyleId>{5C22544A-7EE6-4342-B048-85BDC9FD1C3A}</a:tableStyleId>
-              </a:tblPr>
-              <a:tblGrid>
-                <a:gridCol w="4953000">
-                  <a:extLst>
-                    <a:ext uri="{9D8B030D-6E8A-4147-A177-3AD203B41FA5}">
-                      <a16:colId xmlns:a16="http://schemas.microsoft.com/office/drawing/2014/main" val="1761273252"/>
-                    </a:ext>
-                  </a:extLst>
-                </a:gridCol>
-                <a:gridCol w="4953000">
-                  <a:extLst>
-                    <a:ext uri="{9D8B030D-6E8A-4147-A177-3AD203B41FA5}">
-                      <a16:colId xmlns:a16="http://schemas.microsoft.com/office/drawing/2014/main" val="2172551086"/>
-                    </a:ext>
-                  </a:extLst>
-                </a:gridCol>
-              </a:tblGrid>
-              <a:tr h="370840">
-                <a:tc gridSpan="2">
-                  <a:txBody>
-                    <a:bodyPr/>
-                    <a:lstStyle/>
-                    <a:p>
-                      <a:pPr algn="ctr"/>
-                      <a:r>
-                        <a:rPr lang="de-DE" dirty="0">
-                          <a:effectLst>
-                            <a:outerShdw blurRad="38100" dist="38100" dir="2700000" algn="tl">
-                              <a:srgbClr val="000000">
-                                <a:alpha val="43137"/>
-                              </a:srgbClr>
-                            </a:outerShdw>
-                          </a:effectLst>
-                        </a:rPr>
-                        <a:t>Ansätze der empirischen Sozialforschung</a:t>
-                      </a:r>
-                    </a:p>
-                  </a:txBody>
-                  <a:tcPr/>
-                </a:tc>
-                <a:tc hMerge="1">
-                  <a:txBody>
-                    <a:bodyPr/>
-                    <a:lstStyle/>
-                    <a:p>
-                      <a:endParaRPr lang="de-DE"/>
-                    </a:p>
-                  </a:txBody>
-                  <a:tcPr/>
-                </a:tc>
-                <a:extLst>
-                  <a:ext uri="{0D108BD9-81ED-4DB2-BD59-A6C34878D82A}">
-                    <a16:rowId xmlns:a16="http://schemas.microsoft.com/office/drawing/2014/main" val="1597324515"/>
-                  </a:ext>
-                </a:extLst>
-              </a:tr>
-              <a:tr h="370840">
-                <a:tc>
-                  <a:txBody>
-                    <a:bodyPr/>
-                    <a:lstStyle/>
-                    <a:p>
-                      <a:pPr marL="0" marR="0" lvl="0" indent="0" algn="ctr" defTabSz="457200" rtl="0" eaLnBrk="1" fontAlgn="auto" latinLnBrk="0" hangingPunct="1">
-                        <a:lnSpc>
-                          <a:spcPct val="100000"/>
-                        </a:lnSpc>
-                        <a:spcBef>
-                          <a:spcPts val="0"/>
-                        </a:spcBef>
-                        <a:spcAft>
-                          <a:spcPts val="0"/>
-                        </a:spcAft>
-                        <a:buClrTx/>
-                        <a:buSzTx/>
-                        <a:buFontTx/>
-                        <a:buNone/>
-                        <a:tabLst/>
-                        <a:defRPr/>
-                      </a:pPr>
-                      <a:r>
-                        <a:rPr lang="de-DE" dirty="0">
-                          <a:effectLst>
-                            <a:outerShdw blurRad="38100" dist="38100" dir="2700000" algn="tl">
-                              <a:srgbClr val="000000">
-                                <a:alpha val="43137"/>
-                              </a:srgbClr>
-                            </a:outerShdw>
-                          </a:effectLst>
-                        </a:rPr>
-                        <a:t>Quantitativ:</a:t>
-                      </a:r>
-                    </a:p>
-                    <a:p>
-                      <a:pPr algn="ctr"/>
-                      <a:endParaRPr lang="de-DE" dirty="0">
-                        <a:effectLst>
-                          <a:outerShdw blurRad="38100" dist="38100" dir="2700000" algn="tl">
-                            <a:srgbClr val="000000">
-                              <a:alpha val="43137"/>
-                            </a:srgbClr>
-                          </a:outerShdw>
-                        </a:effectLst>
-                      </a:endParaRPr>
-                    </a:p>
-                  </a:txBody>
-                  <a:tcPr/>
-                </a:tc>
-                <a:tc>
-                  <a:txBody>
-                    <a:bodyPr/>
-                    <a:lstStyle/>
-                    <a:p>
-                      <a:pPr marL="0" marR="0" lvl="0" indent="0" algn="ctr" defTabSz="457200" rtl="0" eaLnBrk="1" fontAlgn="auto" latinLnBrk="0" hangingPunct="1">
-                        <a:lnSpc>
-                          <a:spcPct val="100000"/>
-                        </a:lnSpc>
-                        <a:spcBef>
-                          <a:spcPts val="0"/>
-                        </a:spcBef>
-                        <a:spcAft>
-                          <a:spcPts val="0"/>
-                        </a:spcAft>
-                        <a:buClrTx/>
-                        <a:buSzTx/>
-                        <a:buFontTx/>
-                        <a:buNone/>
-                        <a:tabLst/>
-                        <a:defRPr/>
-                      </a:pPr>
-                      <a:r>
-                        <a:rPr lang="de-DE" dirty="0">
-                          <a:effectLst>
-                            <a:outerShdw blurRad="38100" dist="38100" dir="2700000" algn="tl">
-                              <a:srgbClr val="000000">
-                                <a:alpha val="43137"/>
-                              </a:srgbClr>
-                            </a:outerShdw>
-                          </a:effectLst>
-                        </a:rPr>
-                        <a:t>Qualitativ:</a:t>
-                      </a:r>
-                    </a:p>
-                  </a:txBody>
-                  <a:tcPr/>
-                </a:tc>
-                <a:extLst>
-                  <a:ext uri="{0D108BD9-81ED-4DB2-BD59-A6C34878D82A}">
-                    <a16:rowId xmlns:a16="http://schemas.microsoft.com/office/drawing/2014/main" val="3090413412"/>
-                  </a:ext>
-                </a:extLst>
-              </a:tr>
-              <a:tr h="370840">
-                <a:tc>
-                  <a:txBody>
-                    <a:bodyPr/>
-                    <a:lstStyle/>
-                    <a:p>
-                      <a:pPr marL="0" marR="0" lvl="0" indent="0" algn="l" defTabSz="457200" rtl="0" eaLnBrk="1" fontAlgn="auto" latinLnBrk="0" hangingPunct="1">
-                        <a:lnSpc>
-                          <a:spcPct val="100000"/>
-                        </a:lnSpc>
-                        <a:spcBef>
-                          <a:spcPts val="0"/>
-                        </a:spcBef>
-                        <a:spcAft>
-                          <a:spcPts val="0"/>
-                        </a:spcAft>
-                        <a:buClrTx/>
-                        <a:buSzTx/>
-                        <a:buFontTx/>
-                        <a:buNone/>
-                        <a:tabLst/>
-                        <a:defRPr/>
-                      </a:pPr>
-                      <a:r>
-                        <a:rPr lang="de-DE" b="1" dirty="0"/>
-                        <a:t>Überprüfung</a:t>
-                      </a:r>
-                      <a:r>
-                        <a:rPr lang="de-DE" dirty="0"/>
-                        <a:t> vorhandener Theorien und Hypothesen</a:t>
-                      </a:r>
-                    </a:p>
-                  </a:txBody>
-                  <a:tcPr/>
-                </a:tc>
-                <a:tc>
-                  <a:txBody>
-                    <a:bodyPr/>
-                    <a:lstStyle/>
-                    <a:p>
-                      <a:pPr marL="0" marR="0" lvl="0" indent="0" algn="l" defTabSz="457200" rtl="0" eaLnBrk="1" fontAlgn="auto" latinLnBrk="0" hangingPunct="1">
-                        <a:lnSpc>
-                          <a:spcPct val="100000"/>
-                        </a:lnSpc>
-                        <a:spcBef>
-                          <a:spcPts val="0"/>
-                        </a:spcBef>
-                        <a:spcAft>
-                          <a:spcPts val="0"/>
-                        </a:spcAft>
-                        <a:buClrTx/>
-                        <a:buSzTx/>
-                        <a:buFontTx/>
-                        <a:buNone/>
-                        <a:tabLst/>
-                        <a:defRPr/>
-                      </a:pPr>
-                      <a:r>
-                        <a:rPr lang="de-DE" b="1" dirty="0"/>
-                        <a:t>Entwicklung</a:t>
-                      </a:r>
-                      <a:r>
-                        <a:rPr lang="de-DE" dirty="0"/>
-                        <a:t> neuer Theorien und Hypothesen</a:t>
-                      </a:r>
-                    </a:p>
-                  </a:txBody>
-                  <a:tcPr/>
-                </a:tc>
-                <a:extLst>
-                  <a:ext uri="{0D108BD9-81ED-4DB2-BD59-A6C34878D82A}">
-                    <a16:rowId xmlns:a16="http://schemas.microsoft.com/office/drawing/2014/main" val="4026824468"/>
-                  </a:ext>
-                </a:extLst>
-              </a:tr>
-            </a:tbl>
-          </a:graphicData>
-        </a:graphic>
-      </p:graphicFrame>
+        </p:nvSpPr>
+        <p:spPr/>
+        <p:txBody>
+          <a:bodyPr/>
+          <a:lstStyle/>
+          <a:p>
+            <a:pPr marL="0" indent="0" algn="ctr">
+              <a:buNone/>
+            </a:pPr>
+            <a:r>
+              <a:rPr lang="de-DE" dirty="0"/>
+              <a:t>Die Bezeichnung der Methode gründet der Historie wegen, in der gleichnamigen Stadt Delphi in Griechenland. Dort soll es schriftlichen Überlieferungen zufolge ein Orakel gegeben haben, an welches man sich wenden konnte um eine Vorhersage für die Zukunft zu erhalten.</a:t>
+            </a:r>
+          </a:p>
+          <a:p>
+            <a:pPr marL="0" indent="0" algn="ctr">
+              <a:buNone/>
+            </a:pPr>
+            <a:endParaRPr lang="de-DE" dirty="0"/>
+          </a:p>
+        </p:txBody>
+      </p:sp>
       <p:sp>
         <p:nvSpPr>
-          <p:cNvPr id="3" name="Textfeld 2">
+          <p:cNvPr id="4" name="Textfeld 3">
             <a:extLst>
               <a:ext uri="{FF2B5EF4-FFF2-40B4-BE49-F238E27FC236}">
-                <a16:creationId xmlns:a16="http://schemas.microsoft.com/office/drawing/2014/main" id="{933E464A-C32E-4AC9-82D6-D9BC65167FA7}"/>
+                <a16:creationId xmlns:a16="http://schemas.microsoft.com/office/drawing/2014/main" id="{E4E871CA-4E43-4CA2-B078-44D1F22AF6D9}"/>
               </a:ext>
             </a:extLst>
           </p:cNvPr>
@@ -24553,8 +25777,8 @@
         </p:nvSpPr>
         <p:spPr>
           <a:xfrm>
-            <a:off x="6826931" y="5728062"/>
-            <a:ext cx="5365069" cy="830997"/>
+            <a:off x="9224387" y="6109900"/>
+            <a:ext cx="2964209" cy="276999"/>
           </a:xfrm>
           <a:prstGeom prst="rect">
             <a:avLst/>
@@ -24562,7 +25786,7 @@
           <a:noFill/>
         </p:spPr>
         <p:txBody>
-          <a:bodyPr wrap="square" rtlCol="0">
+          <a:bodyPr wrap="none" rtlCol="0">
             <a:spAutoFit/>
           </a:bodyPr>
           <a:lstStyle/>
@@ -24572,57 +25796,36 @@
                 <a:solidFill>
                   <a:schemeClr val="accent4"/>
                 </a:solidFill>
+                <a:effectLst/>
+                <a:ea typeface="Calibri" panose="020F0502020204030204" pitchFamily="34" charset="0"/>
+                <a:cs typeface="Times New Roman" panose="02020603050405020304" pitchFamily="18" charset="0"/>
               </a:rPr>
-              <a:t>Quellen: </a:t>
+              <a:t>Quelle</a:t>
             </a:r>
-          </a:p>
-          <a:p>
             <a:r>
               <a:rPr lang="de-DE" sz="1200" dirty="0">
                 <a:solidFill>
                   <a:schemeClr val="accent4"/>
                 </a:solidFill>
+                <a:effectLst/>
+                <a:latin typeface="Calibri" panose="020F0502020204030204" pitchFamily="34" charset="0"/>
+                <a:ea typeface="Calibri" panose="020F0502020204030204" pitchFamily="34" charset="0"/>
+                <a:cs typeface="Times New Roman" panose="02020603050405020304" pitchFamily="18" charset="0"/>
               </a:rPr>
-              <a:t>Eigene Darstellung</a:t>
+              <a:t>: Vgl. Romeike &amp; Hager, 2020, S. 29ff.</a:t>
             </a:r>
-          </a:p>
-          <a:p>
-            <a:r>
-              <a:rPr lang="de-DE" sz="1200" dirty="0">
-                <a:solidFill>
-                  <a:schemeClr val="accent4"/>
-                </a:solidFill>
-              </a:rPr>
-              <a:t>vgl</a:t>
-            </a:r>
-            <a:r>
-              <a:rPr lang="de-DE" sz="1200" dirty="0"/>
-              <a:t>. </a:t>
-            </a:r>
-            <a:r>
-              <a:rPr lang="de-DE" sz="1200" dirty="0">
-                <a:hlinkClick r:id="rId2"/>
-              </a:rPr>
-              <a:t>https://www.scribbr.de/methodik/empirische-sozialforschung/</a:t>
-            </a:r>
-            <a:endParaRPr lang="de-DE" sz="1200" dirty="0"/>
-          </a:p>
-          <a:p>
-            <a:r>
-              <a:rPr lang="de-DE" sz="1200" dirty="0">
-                <a:solidFill>
-                  <a:schemeClr val="accent3"/>
-                </a:solidFill>
-              </a:rPr>
-              <a:t>vgl. Moon, 2021, S. 138, 152, 169</a:t>
-            </a:r>
+            <a:endParaRPr lang="de-DE" sz="1200" dirty="0">
+              <a:solidFill>
+                <a:schemeClr val="accent4"/>
+              </a:solidFill>
+            </a:endParaRPr>
           </a:p>
         </p:txBody>
       </p:sp>
     </p:spTree>
     <p:extLst>
       <p:ext uri="{BB962C8B-B14F-4D97-AF65-F5344CB8AC3E}">
-        <p14:creationId xmlns:p14="http://schemas.microsoft.com/office/powerpoint/2010/main" val="1457865203"/>
+        <p14:creationId xmlns:p14="http://schemas.microsoft.com/office/powerpoint/2010/main" val="1043685735"/>
       </p:ext>
     </p:extLst>
   </p:cSld>

</xml_diff>